<commit_message>
Finish Project contribution section
</commit_message>
<xml_diff>
--- a/interim_report/images/scanner_structure.pptx
+++ b/interim_report/images/scanner_structure.pptx
@@ -6,6 +6,7 @@
   </p:sldMasterIdLst>
   <p:sldIdLst>
     <p:sldId id="256" r:id="rId2"/>
+    <p:sldId id="257" r:id="rId3"/>
   </p:sldIdLst>
   <p:sldSz cx="12192000" cy="6858000"/>
   <p:notesSz cx="6858000" cy="9144000"/>
@@ -104,6 +105,11 @@
       </a:defRPr>
     </a:lvl9pPr>
   </p:defaultTextStyle>
+  <p:extLst>
+    <p:ext uri="{EFAFB233-063F-42B5-8137-9DF3F51BA10A}">
+      <p15:sldGuideLst xmlns:p15="http://schemas.microsoft.com/office/powerpoint/2012/main"/>
+    </p:ext>
+  </p:extLst>
 </p:presentation>
 </file>
 
@@ -254,7 +260,7 @@
           <a:p>
             <a:fld id="{CC56FFBD-2E98-FF44-8982-AF98EEC18F98}" type="datetimeFigureOut">
               <a:rPr lang="en-US" smtClean="0"/>
-              <a:t>1/20/18</a:t>
+              <a:t>1/22/18</a:t>
             </a:fld>
             <a:endParaRPr lang="en-US"/>
           </a:p>
@@ -452,7 +458,7 @@
           <a:p>
             <a:fld id="{CC56FFBD-2E98-FF44-8982-AF98EEC18F98}" type="datetimeFigureOut">
               <a:rPr lang="en-US" smtClean="0"/>
-              <a:t>1/20/18</a:t>
+              <a:t>1/22/18</a:t>
             </a:fld>
             <a:endParaRPr lang="en-US"/>
           </a:p>
@@ -660,7 +666,7 @@
           <a:p>
             <a:fld id="{CC56FFBD-2E98-FF44-8982-AF98EEC18F98}" type="datetimeFigureOut">
               <a:rPr lang="en-US" smtClean="0"/>
-              <a:t>1/20/18</a:t>
+              <a:t>1/22/18</a:t>
             </a:fld>
             <a:endParaRPr lang="en-US"/>
           </a:p>
@@ -858,7 +864,7 @@
           <a:p>
             <a:fld id="{CC56FFBD-2E98-FF44-8982-AF98EEC18F98}" type="datetimeFigureOut">
               <a:rPr lang="en-US" smtClean="0"/>
-              <a:t>1/20/18</a:t>
+              <a:t>1/22/18</a:t>
             </a:fld>
             <a:endParaRPr lang="en-US"/>
           </a:p>
@@ -1133,7 +1139,7 @@
           <a:p>
             <a:fld id="{CC56FFBD-2E98-FF44-8982-AF98EEC18F98}" type="datetimeFigureOut">
               <a:rPr lang="en-US" smtClean="0"/>
-              <a:t>1/20/18</a:t>
+              <a:t>1/22/18</a:t>
             </a:fld>
             <a:endParaRPr lang="en-US"/>
           </a:p>
@@ -1398,7 +1404,7 @@
           <a:p>
             <a:fld id="{CC56FFBD-2E98-FF44-8982-AF98EEC18F98}" type="datetimeFigureOut">
               <a:rPr lang="en-US" smtClean="0"/>
-              <a:t>1/20/18</a:t>
+              <a:t>1/22/18</a:t>
             </a:fld>
             <a:endParaRPr lang="en-US"/>
           </a:p>
@@ -1810,7 +1816,7 @@
           <a:p>
             <a:fld id="{CC56FFBD-2E98-FF44-8982-AF98EEC18F98}" type="datetimeFigureOut">
               <a:rPr lang="en-US" smtClean="0"/>
-              <a:t>1/20/18</a:t>
+              <a:t>1/22/18</a:t>
             </a:fld>
             <a:endParaRPr lang="en-US"/>
           </a:p>
@@ -1951,7 +1957,7 @@
           <a:p>
             <a:fld id="{CC56FFBD-2E98-FF44-8982-AF98EEC18F98}" type="datetimeFigureOut">
               <a:rPr lang="en-US" smtClean="0"/>
-              <a:t>1/20/18</a:t>
+              <a:t>1/22/18</a:t>
             </a:fld>
             <a:endParaRPr lang="en-US"/>
           </a:p>
@@ -2064,7 +2070,7 @@
           <a:p>
             <a:fld id="{CC56FFBD-2E98-FF44-8982-AF98EEC18F98}" type="datetimeFigureOut">
               <a:rPr lang="en-US" smtClean="0"/>
-              <a:t>1/20/18</a:t>
+              <a:t>1/22/18</a:t>
             </a:fld>
             <a:endParaRPr lang="en-US"/>
           </a:p>
@@ -2375,7 +2381,7 @@
           <a:p>
             <a:fld id="{CC56FFBD-2E98-FF44-8982-AF98EEC18F98}" type="datetimeFigureOut">
               <a:rPr lang="en-US" smtClean="0"/>
-              <a:t>1/20/18</a:t>
+              <a:t>1/22/18</a:t>
             </a:fld>
             <a:endParaRPr lang="en-US"/>
           </a:p>
@@ -2663,7 +2669,7 @@
           <a:p>
             <a:fld id="{CC56FFBD-2E98-FF44-8982-AF98EEC18F98}" type="datetimeFigureOut">
               <a:rPr lang="en-US" smtClean="0"/>
-              <a:t>1/20/18</a:t>
+              <a:t>1/22/18</a:t>
             </a:fld>
             <a:endParaRPr lang="en-US"/>
           </a:p>
@@ -2904,7 +2910,7 @@
           <a:p>
             <a:fld id="{CC56FFBD-2E98-FF44-8982-AF98EEC18F98}" type="datetimeFigureOut">
               <a:rPr lang="en-US" smtClean="0"/>
-              <a:t>1/20/18</a:t>
+              <a:t>1/22/18</a:t>
             </a:fld>
             <a:endParaRPr lang="en-US"/>
           </a:p>
@@ -5229,7 +5235,7 @@
         </p:nvSpPr>
         <p:spPr>
           <a:xfrm>
-            <a:off x="137775" y="3453141"/>
+            <a:off x="3775304" y="-24330"/>
             <a:ext cx="11444287" cy="3625657"/>
           </a:xfrm>
           <a:prstGeom prst="roundRect">
@@ -5312,6 +5318,3401 @@
     <p:extLst>
       <p:ext uri="{BB962C8B-B14F-4D97-AF65-F5344CB8AC3E}">
         <p14:creationId xmlns:p14="http://schemas.microsoft.com/office/powerpoint/2010/main" val="1053801484"/>
+      </p:ext>
+    </p:extLst>
+  </p:cSld>
+  <p:clrMapOvr>
+    <a:masterClrMapping/>
+  </p:clrMapOvr>
+</p:sld>
+</file>
+
+<file path=ppt/slides/slide2.xml><?xml version="1.0" encoding="utf-8"?>
+<p:sld xmlns:a="http://schemas.openxmlformats.org/drawingml/2006/main" xmlns:r="http://schemas.openxmlformats.org/officeDocument/2006/relationships" xmlns:p="http://schemas.openxmlformats.org/presentationml/2006/main">
+  <p:cSld>
+    <p:spTree>
+      <p:nvGrpSpPr>
+        <p:cNvPr id="1" name=""/>
+        <p:cNvGrpSpPr/>
+        <p:nvPr/>
+      </p:nvGrpSpPr>
+      <p:grpSpPr>
+        <a:xfrm>
+          <a:off x="0" y="0"/>
+          <a:ext cx="0" cy="0"/>
+          <a:chOff x="0" y="0"/>
+          <a:chExt cx="0" cy="0"/>
+        </a:xfrm>
+      </p:grpSpPr>
+      <p:grpSp>
+        <p:nvGrpSpPr>
+          <p:cNvPr id="134" name="Group 133">
+            <a:extLst>
+              <a:ext uri="{FF2B5EF4-FFF2-40B4-BE49-F238E27FC236}">
+                <a16:creationId xmlns:a16="http://schemas.microsoft.com/office/drawing/2014/main" id="{90167A07-2BDB-AB48-AD6F-6471507D9104}"/>
+              </a:ext>
+            </a:extLst>
+          </p:cNvPr>
+          <p:cNvGrpSpPr/>
+          <p:nvPr/>
+        </p:nvGrpSpPr>
+        <p:grpSpPr>
+          <a:xfrm>
+            <a:off x="369703" y="496506"/>
+            <a:ext cx="10835185" cy="2507817"/>
+            <a:chOff x="396086" y="544406"/>
+            <a:chExt cx="10835185" cy="2507817"/>
+          </a:xfrm>
+        </p:grpSpPr>
+        <p:grpSp>
+          <p:nvGrpSpPr>
+            <p:cNvPr id="26" name="Group 25">
+              <a:extLst>
+                <a:ext uri="{FF2B5EF4-FFF2-40B4-BE49-F238E27FC236}">
+                  <a16:creationId xmlns:a16="http://schemas.microsoft.com/office/drawing/2014/main" id="{A4C56E71-0D3C-0F48-865B-7841C7827C62}"/>
+                </a:ext>
+              </a:extLst>
+            </p:cNvPr>
+            <p:cNvGrpSpPr/>
+            <p:nvPr/>
+          </p:nvGrpSpPr>
+          <p:grpSpPr>
+            <a:xfrm>
+              <a:off x="396086" y="666653"/>
+              <a:ext cx="2286000" cy="2368296"/>
+              <a:chOff x="1391168" y="2430590"/>
+              <a:chExt cx="2286000" cy="2368296"/>
+            </a:xfrm>
+          </p:grpSpPr>
+          <p:grpSp>
+            <p:nvGrpSpPr>
+              <p:cNvPr id="21" name="Group 20">
+                <a:extLst>
+                  <a:ext uri="{FF2B5EF4-FFF2-40B4-BE49-F238E27FC236}">
+                    <a16:creationId xmlns:a16="http://schemas.microsoft.com/office/drawing/2014/main" id="{AC6E1E7A-926C-EC46-A158-60928B839D9B}"/>
+                  </a:ext>
+                </a:extLst>
+              </p:cNvPr>
+              <p:cNvGrpSpPr/>
+              <p:nvPr/>
+            </p:nvGrpSpPr>
+            <p:grpSpPr>
+              <a:xfrm>
+                <a:off x="2006211" y="2847975"/>
+                <a:ext cx="1055915" cy="903514"/>
+                <a:chOff x="2006211" y="2847975"/>
+                <a:chExt cx="1055915" cy="903514"/>
+              </a:xfrm>
+            </p:grpSpPr>
+            <p:sp>
+              <p:nvSpPr>
+                <p:cNvPr id="15" name="Rounded Rectangle 14">
+                  <a:extLst>
+                    <a:ext uri="{FF2B5EF4-FFF2-40B4-BE49-F238E27FC236}">
+                      <a16:creationId xmlns:a16="http://schemas.microsoft.com/office/drawing/2014/main" id="{5107EF5E-4040-6842-BFB1-7B72E0C07905}"/>
+                    </a:ext>
+                  </a:extLst>
+                </p:cNvPr>
+                <p:cNvSpPr/>
+                <p:nvPr/>
+              </p:nvSpPr>
+              <p:spPr>
+                <a:xfrm>
+                  <a:off x="2006211" y="2847975"/>
+                  <a:ext cx="1055915" cy="903514"/>
+                </a:xfrm>
+                <a:prstGeom prst="roundRect">
+                  <a:avLst/>
+                </a:prstGeom>
+                <a:noFill/>
+                <a:ln w="38100"/>
+              </p:spPr>
+              <p:style>
+                <a:lnRef idx="2">
+                  <a:schemeClr val="accent1">
+                    <a:shade val="50000"/>
+                  </a:schemeClr>
+                </a:lnRef>
+                <a:fillRef idx="1">
+                  <a:schemeClr val="accent1"/>
+                </a:fillRef>
+                <a:effectRef idx="0">
+                  <a:schemeClr val="accent1"/>
+                </a:effectRef>
+                <a:fontRef idx="minor">
+                  <a:schemeClr val="lt1"/>
+                </a:fontRef>
+              </p:style>
+              <p:txBody>
+                <a:bodyPr rtlCol="0" anchor="ctr"/>
+                <a:lstStyle/>
+                <a:p>
+                  <a:pPr algn="ctr"/>
+                  <a:endParaRPr lang="en-US" dirty="0"/>
+                </a:p>
+              </p:txBody>
+            </p:sp>
+            <p:sp>
+              <p:nvSpPr>
+                <p:cNvPr id="19" name="Trapezoid 18">
+                  <a:extLst>
+                    <a:ext uri="{FF2B5EF4-FFF2-40B4-BE49-F238E27FC236}">
+                      <a16:creationId xmlns:a16="http://schemas.microsoft.com/office/drawing/2014/main" id="{71A7B91D-338C-CE49-8696-103F18915EFB}"/>
+                    </a:ext>
+                  </a:extLst>
+                </p:cNvPr>
+                <p:cNvSpPr/>
+                <p:nvPr/>
+              </p:nvSpPr>
+              <p:spPr>
+                <a:xfrm>
+                  <a:off x="2257425" y="3299732"/>
+                  <a:ext cx="528638" cy="315006"/>
+                </a:xfrm>
+                <a:prstGeom prst="trapezoid">
+                  <a:avLst/>
+                </a:prstGeom>
+                <a:ln>
+                  <a:noFill/>
+                </a:ln>
+              </p:spPr>
+              <p:style>
+                <a:lnRef idx="2">
+                  <a:schemeClr val="accent1">
+                    <a:shade val="50000"/>
+                  </a:schemeClr>
+                </a:lnRef>
+                <a:fillRef idx="1">
+                  <a:schemeClr val="accent1"/>
+                </a:fillRef>
+                <a:effectRef idx="0">
+                  <a:schemeClr val="accent1"/>
+                </a:effectRef>
+                <a:fontRef idx="minor">
+                  <a:schemeClr val="lt1"/>
+                </a:fontRef>
+              </p:style>
+              <p:txBody>
+                <a:bodyPr rtlCol="0" anchor="ctr"/>
+                <a:lstStyle/>
+                <a:p>
+                  <a:pPr algn="ctr"/>
+                  <a:endParaRPr lang="en-US"/>
+                </a:p>
+              </p:txBody>
+            </p:sp>
+            <p:sp>
+              <p:nvSpPr>
+                <p:cNvPr id="20" name="Teardrop 19">
+                  <a:extLst>
+                    <a:ext uri="{FF2B5EF4-FFF2-40B4-BE49-F238E27FC236}">
+                      <a16:creationId xmlns:a16="http://schemas.microsoft.com/office/drawing/2014/main" id="{513DDE5A-C3F9-B745-B2DE-5A665A3BC78E}"/>
+                    </a:ext>
+                  </a:extLst>
+                </p:cNvPr>
+                <p:cNvSpPr/>
+                <p:nvPr/>
+              </p:nvSpPr>
+              <p:spPr>
+                <a:xfrm>
+                  <a:off x="2370706" y="3005819"/>
+                  <a:ext cx="310924" cy="314324"/>
+                </a:xfrm>
+                <a:prstGeom prst="teardrop">
+                  <a:avLst>
+                    <a:gd name="adj" fmla="val 118708"/>
+                  </a:avLst>
+                </a:prstGeom>
+                <a:ln>
+                  <a:noFill/>
+                </a:ln>
+              </p:spPr>
+              <p:style>
+                <a:lnRef idx="2">
+                  <a:schemeClr val="accent1">
+                    <a:shade val="50000"/>
+                  </a:schemeClr>
+                </a:lnRef>
+                <a:fillRef idx="1">
+                  <a:schemeClr val="accent1"/>
+                </a:fillRef>
+                <a:effectRef idx="0">
+                  <a:schemeClr val="accent1"/>
+                </a:effectRef>
+                <a:fontRef idx="minor">
+                  <a:schemeClr val="lt1"/>
+                </a:fontRef>
+              </p:style>
+              <p:txBody>
+                <a:bodyPr rtlCol="0" anchor="ctr"/>
+                <a:lstStyle/>
+                <a:p>
+                  <a:pPr algn="ctr"/>
+                  <a:endParaRPr lang="en-US"/>
+                </a:p>
+              </p:txBody>
+            </p:sp>
+          </p:grpSp>
+          <p:sp>
+            <p:nvSpPr>
+              <p:cNvPr id="22" name="TextBox 21">
+                <a:extLst>
+                  <a:ext uri="{FF2B5EF4-FFF2-40B4-BE49-F238E27FC236}">
+                    <a16:creationId xmlns:a16="http://schemas.microsoft.com/office/drawing/2014/main" id="{F551AC19-4284-FA4A-B9A5-8E919033D509}"/>
+                  </a:ext>
+                </a:extLst>
+              </p:cNvPr>
+              <p:cNvSpPr txBox="1"/>
+              <p:nvPr/>
+            </p:nvSpPr>
+            <p:spPr>
+              <a:xfrm>
+                <a:off x="1904513" y="3804885"/>
+                <a:ext cx="1672158" cy="338554"/>
+              </a:xfrm>
+              <a:prstGeom prst="rect">
+                <a:avLst/>
+              </a:prstGeom>
+              <a:noFill/>
+            </p:spPr>
+            <p:txBody>
+              <a:bodyPr wrap="square" rtlCol="0">
+                <a:spAutoFit/>
+              </a:bodyPr>
+              <a:lstStyle/>
+              <a:p>
+                <a:r>
+                  <a:rPr lang="en-US" sz="1600" dirty="0"/>
+                  <a:t>Eve: Great hair!</a:t>
+                </a:r>
+              </a:p>
+            </p:txBody>
+          </p:sp>
+          <p:sp>
+            <p:nvSpPr>
+              <p:cNvPr id="23" name="TextBox 22">
+                <a:extLst>
+                  <a:ext uri="{FF2B5EF4-FFF2-40B4-BE49-F238E27FC236}">
+                    <a16:creationId xmlns:a16="http://schemas.microsoft.com/office/drawing/2014/main" id="{E3D79790-9411-B542-BDB3-51B2D87464FF}"/>
+                  </a:ext>
+                </a:extLst>
+              </p:cNvPr>
+              <p:cNvSpPr txBox="1"/>
+              <p:nvPr/>
+            </p:nvSpPr>
+            <p:spPr>
+              <a:xfrm>
+                <a:off x="1943461" y="4066495"/>
+                <a:ext cx="1407422" cy="584775"/>
+              </a:xfrm>
+              <a:prstGeom prst="rect">
+                <a:avLst/>
+              </a:prstGeom>
+              <a:noFill/>
+              <a:ln>
+                <a:solidFill>
+                  <a:schemeClr val="tx1"/>
+                </a:solidFill>
+              </a:ln>
+            </p:spPr>
+            <p:txBody>
+              <a:bodyPr wrap="square" rtlCol="0">
+                <a:spAutoFit/>
+              </a:bodyPr>
+              <a:lstStyle/>
+              <a:p>
+                <a:r>
+                  <a:rPr lang="en-US" sz="1600" dirty="0"/>
+                  <a:t>Add a comment…</a:t>
+                </a:r>
+              </a:p>
+            </p:txBody>
+          </p:sp>
+          <p:sp>
+            <p:nvSpPr>
+              <p:cNvPr id="24" name="Rounded Rectangle 23">
+                <a:extLst>
+                  <a:ext uri="{FF2B5EF4-FFF2-40B4-BE49-F238E27FC236}">
+                    <a16:creationId xmlns:a16="http://schemas.microsoft.com/office/drawing/2014/main" id="{49D09087-4C7C-1644-ACAA-CBA6B0D70E26}"/>
+                  </a:ext>
+                </a:extLst>
+              </p:cNvPr>
+              <p:cNvSpPr/>
+              <p:nvPr/>
+            </p:nvSpPr>
+            <p:spPr>
+              <a:xfrm>
+                <a:off x="1391168" y="2430590"/>
+                <a:ext cx="2286000" cy="2368296"/>
+              </a:xfrm>
+              <a:prstGeom prst="roundRect">
+                <a:avLst/>
+              </a:prstGeom>
+              <a:noFill/>
+              <a:ln w="38100"/>
+            </p:spPr>
+            <p:style>
+              <a:lnRef idx="2">
+                <a:schemeClr val="accent1">
+                  <a:shade val="50000"/>
+                </a:schemeClr>
+              </a:lnRef>
+              <a:fillRef idx="1">
+                <a:schemeClr val="accent1"/>
+              </a:fillRef>
+              <a:effectRef idx="0">
+                <a:schemeClr val="accent1"/>
+              </a:effectRef>
+              <a:fontRef idx="minor">
+                <a:schemeClr val="lt1"/>
+              </a:fontRef>
+            </p:style>
+            <p:txBody>
+              <a:bodyPr rtlCol="0" anchor="ctr"/>
+              <a:lstStyle/>
+              <a:p>
+                <a:pPr algn="ctr"/>
+                <a:endParaRPr lang="en-US"/>
+              </a:p>
+            </p:txBody>
+          </p:sp>
+          <p:sp>
+            <p:nvSpPr>
+              <p:cNvPr id="25" name="Rounded Rectangle 24">
+                <a:extLst>
+                  <a:ext uri="{FF2B5EF4-FFF2-40B4-BE49-F238E27FC236}">
+                    <a16:creationId xmlns:a16="http://schemas.microsoft.com/office/drawing/2014/main" id="{FE949263-C2F4-824F-A71C-035B4C7DEC7D}"/>
+                  </a:ext>
+                </a:extLst>
+              </p:cNvPr>
+              <p:cNvSpPr/>
+              <p:nvPr/>
+            </p:nvSpPr>
+            <p:spPr>
+              <a:xfrm>
+                <a:off x="1391168" y="2447864"/>
+                <a:ext cx="2286000" cy="322767"/>
+              </a:xfrm>
+              <a:prstGeom prst="roundRect">
+                <a:avLst>
+                  <a:gd name="adj" fmla="val 50000"/>
+                </a:avLst>
+              </a:prstGeom>
+            </p:spPr>
+            <p:style>
+              <a:lnRef idx="2">
+                <a:schemeClr val="accent1">
+                  <a:shade val="50000"/>
+                </a:schemeClr>
+              </a:lnRef>
+              <a:fillRef idx="1">
+                <a:schemeClr val="accent1"/>
+              </a:fillRef>
+              <a:effectRef idx="0">
+                <a:schemeClr val="accent1"/>
+              </a:effectRef>
+              <a:fontRef idx="minor">
+                <a:schemeClr val="lt1"/>
+              </a:fontRef>
+            </p:style>
+            <p:txBody>
+              <a:bodyPr rtlCol="0" anchor="ctr"/>
+              <a:lstStyle/>
+              <a:p>
+                <a:pPr algn="ctr"/>
+                <a:r>
+                  <a:rPr lang="en-US" dirty="0" err="1"/>
+                  <a:t>target.com</a:t>
+                </a:r>
+                <a:r>
+                  <a:rPr lang="en-US" dirty="0"/>
+                  <a:t>/pic/1234</a:t>
+                </a:r>
+              </a:p>
+            </p:txBody>
+          </p:sp>
+        </p:grpSp>
+        <p:grpSp>
+          <p:nvGrpSpPr>
+            <p:cNvPr id="27" name="Group 26">
+              <a:extLst>
+                <a:ext uri="{FF2B5EF4-FFF2-40B4-BE49-F238E27FC236}">
+                  <a16:creationId xmlns:a16="http://schemas.microsoft.com/office/drawing/2014/main" id="{D5DE2978-52E3-C44B-9EE3-47020A5D92A4}"/>
+                </a:ext>
+              </a:extLst>
+            </p:cNvPr>
+            <p:cNvGrpSpPr/>
+            <p:nvPr/>
+          </p:nvGrpSpPr>
+          <p:grpSpPr>
+            <a:xfrm>
+              <a:off x="4822171" y="683927"/>
+              <a:ext cx="2456715" cy="2368296"/>
+              <a:chOff x="1391168" y="2430590"/>
+              <a:chExt cx="2456715" cy="2368296"/>
+            </a:xfrm>
+          </p:grpSpPr>
+          <p:grpSp>
+            <p:nvGrpSpPr>
+              <p:cNvPr id="28" name="Group 27">
+                <a:extLst>
+                  <a:ext uri="{FF2B5EF4-FFF2-40B4-BE49-F238E27FC236}">
+                    <a16:creationId xmlns:a16="http://schemas.microsoft.com/office/drawing/2014/main" id="{D624E9B6-EF96-1A48-9ADC-6AD5097820C2}"/>
+                  </a:ext>
+                </a:extLst>
+              </p:cNvPr>
+              <p:cNvGrpSpPr/>
+              <p:nvPr/>
+            </p:nvGrpSpPr>
+            <p:grpSpPr>
+              <a:xfrm>
+                <a:off x="2006211" y="2847975"/>
+                <a:ext cx="1055915" cy="903514"/>
+                <a:chOff x="2006211" y="2847975"/>
+                <a:chExt cx="1055915" cy="903514"/>
+              </a:xfrm>
+            </p:grpSpPr>
+            <p:sp>
+              <p:nvSpPr>
+                <p:cNvPr id="33" name="Rounded Rectangle 32">
+                  <a:extLst>
+                    <a:ext uri="{FF2B5EF4-FFF2-40B4-BE49-F238E27FC236}">
+                      <a16:creationId xmlns:a16="http://schemas.microsoft.com/office/drawing/2014/main" id="{4BC5147E-CD72-A446-9BC9-AC4BCDF40434}"/>
+                    </a:ext>
+                  </a:extLst>
+                </p:cNvPr>
+                <p:cNvSpPr/>
+                <p:nvPr/>
+              </p:nvSpPr>
+              <p:spPr>
+                <a:xfrm>
+                  <a:off x="2006211" y="2847975"/>
+                  <a:ext cx="1055915" cy="903514"/>
+                </a:xfrm>
+                <a:prstGeom prst="roundRect">
+                  <a:avLst/>
+                </a:prstGeom>
+                <a:noFill/>
+                <a:ln w="38100"/>
+              </p:spPr>
+              <p:style>
+                <a:lnRef idx="2">
+                  <a:schemeClr val="accent1">
+                    <a:shade val="50000"/>
+                  </a:schemeClr>
+                </a:lnRef>
+                <a:fillRef idx="1">
+                  <a:schemeClr val="accent1"/>
+                </a:fillRef>
+                <a:effectRef idx="0">
+                  <a:schemeClr val="accent1"/>
+                </a:effectRef>
+                <a:fontRef idx="minor">
+                  <a:schemeClr val="lt1"/>
+                </a:fontRef>
+              </p:style>
+              <p:txBody>
+                <a:bodyPr rtlCol="0" anchor="ctr"/>
+                <a:lstStyle/>
+                <a:p>
+                  <a:pPr algn="ctr"/>
+                  <a:endParaRPr lang="en-US" dirty="0"/>
+                </a:p>
+              </p:txBody>
+            </p:sp>
+            <p:sp>
+              <p:nvSpPr>
+                <p:cNvPr id="34" name="Trapezoid 33">
+                  <a:extLst>
+                    <a:ext uri="{FF2B5EF4-FFF2-40B4-BE49-F238E27FC236}">
+                      <a16:creationId xmlns:a16="http://schemas.microsoft.com/office/drawing/2014/main" id="{C3461242-8EA9-E74B-8410-9A0D443DC087}"/>
+                    </a:ext>
+                  </a:extLst>
+                </p:cNvPr>
+                <p:cNvSpPr/>
+                <p:nvPr/>
+              </p:nvSpPr>
+              <p:spPr>
+                <a:xfrm>
+                  <a:off x="2257425" y="3299732"/>
+                  <a:ext cx="528638" cy="315006"/>
+                </a:xfrm>
+                <a:prstGeom prst="trapezoid">
+                  <a:avLst/>
+                </a:prstGeom>
+                <a:ln>
+                  <a:noFill/>
+                </a:ln>
+              </p:spPr>
+              <p:style>
+                <a:lnRef idx="2">
+                  <a:schemeClr val="accent1">
+                    <a:shade val="50000"/>
+                  </a:schemeClr>
+                </a:lnRef>
+                <a:fillRef idx="1">
+                  <a:schemeClr val="accent1"/>
+                </a:fillRef>
+                <a:effectRef idx="0">
+                  <a:schemeClr val="accent1"/>
+                </a:effectRef>
+                <a:fontRef idx="minor">
+                  <a:schemeClr val="lt1"/>
+                </a:fontRef>
+              </p:style>
+              <p:txBody>
+                <a:bodyPr rtlCol="0" anchor="ctr"/>
+                <a:lstStyle/>
+                <a:p>
+                  <a:pPr algn="ctr"/>
+                  <a:endParaRPr lang="en-US"/>
+                </a:p>
+              </p:txBody>
+            </p:sp>
+            <p:sp>
+              <p:nvSpPr>
+                <p:cNvPr id="35" name="Teardrop 34">
+                  <a:extLst>
+                    <a:ext uri="{FF2B5EF4-FFF2-40B4-BE49-F238E27FC236}">
+                      <a16:creationId xmlns:a16="http://schemas.microsoft.com/office/drawing/2014/main" id="{2CF0525E-0348-6B45-BA86-09DF89E46BEE}"/>
+                    </a:ext>
+                  </a:extLst>
+                </p:cNvPr>
+                <p:cNvSpPr/>
+                <p:nvPr/>
+              </p:nvSpPr>
+              <p:spPr>
+                <a:xfrm>
+                  <a:off x="2370706" y="3005819"/>
+                  <a:ext cx="310924" cy="314324"/>
+                </a:xfrm>
+                <a:prstGeom prst="teardrop">
+                  <a:avLst>
+                    <a:gd name="adj" fmla="val 118708"/>
+                  </a:avLst>
+                </a:prstGeom>
+                <a:ln>
+                  <a:noFill/>
+                </a:ln>
+              </p:spPr>
+              <p:style>
+                <a:lnRef idx="2">
+                  <a:schemeClr val="accent1">
+                    <a:shade val="50000"/>
+                  </a:schemeClr>
+                </a:lnRef>
+                <a:fillRef idx="1">
+                  <a:schemeClr val="accent1"/>
+                </a:fillRef>
+                <a:effectRef idx="0">
+                  <a:schemeClr val="accent1"/>
+                </a:effectRef>
+                <a:fontRef idx="minor">
+                  <a:schemeClr val="lt1"/>
+                </a:fontRef>
+              </p:style>
+              <p:txBody>
+                <a:bodyPr rtlCol="0" anchor="ctr"/>
+                <a:lstStyle/>
+                <a:p>
+                  <a:pPr algn="ctr"/>
+                  <a:endParaRPr lang="en-US"/>
+                </a:p>
+              </p:txBody>
+            </p:sp>
+          </p:grpSp>
+          <p:sp>
+            <p:nvSpPr>
+              <p:cNvPr id="29" name="TextBox 28">
+                <a:extLst>
+                  <a:ext uri="{FF2B5EF4-FFF2-40B4-BE49-F238E27FC236}">
+                    <a16:creationId xmlns:a16="http://schemas.microsoft.com/office/drawing/2014/main" id="{723C1E4E-3896-9F42-882F-800090D421AE}"/>
+                  </a:ext>
+                </a:extLst>
+              </p:cNvPr>
+              <p:cNvSpPr txBox="1"/>
+              <p:nvPr/>
+            </p:nvSpPr>
+            <p:spPr>
+              <a:xfrm>
+                <a:off x="1792219" y="3804884"/>
+                <a:ext cx="2055664" cy="338554"/>
+              </a:xfrm>
+              <a:prstGeom prst="rect">
+                <a:avLst/>
+              </a:prstGeom>
+              <a:noFill/>
+            </p:spPr>
+            <p:txBody>
+              <a:bodyPr wrap="square" rtlCol="0">
+                <a:spAutoFit/>
+              </a:bodyPr>
+              <a:lstStyle/>
+              <a:p>
+                <a:r>
+                  <a:rPr lang="en-US" sz="1600" dirty="0"/>
+                  <a:t>Eve: Great hair!</a:t>
+                </a:r>
+              </a:p>
+            </p:txBody>
+          </p:sp>
+          <p:sp>
+            <p:nvSpPr>
+              <p:cNvPr id="30" name="TextBox 29">
+                <a:extLst>
+                  <a:ext uri="{FF2B5EF4-FFF2-40B4-BE49-F238E27FC236}">
+                    <a16:creationId xmlns:a16="http://schemas.microsoft.com/office/drawing/2014/main" id="{BBBDA519-3117-574A-B2FD-787C2C9D9192}"/>
+                  </a:ext>
+                </a:extLst>
+              </p:cNvPr>
+              <p:cNvSpPr txBox="1"/>
+              <p:nvPr/>
+            </p:nvSpPr>
+            <p:spPr>
+              <a:xfrm>
+                <a:off x="1904513" y="4066495"/>
+                <a:ext cx="1522846" cy="523220"/>
+              </a:xfrm>
+              <a:prstGeom prst="rect">
+                <a:avLst/>
+              </a:prstGeom>
+              <a:noFill/>
+              <a:ln>
+                <a:solidFill>
+                  <a:schemeClr val="tx1"/>
+                </a:solidFill>
+              </a:ln>
+            </p:spPr>
+            <p:txBody>
+              <a:bodyPr wrap="square" rtlCol="0">
+                <a:spAutoFit/>
+              </a:bodyPr>
+              <a:lstStyle/>
+              <a:p>
+                <a:r>
+                  <a:rPr lang="en-US" sz="1400" dirty="0"/>
+                  <a:t>&lt;script&gt;alert(“XSS”)&lt;/script&gt;</a:t>
+                </a:r>
+              </a:p>
+            </p:txBody>
+          </p:sp>
+          <p:sp>
+            <p:nvSpPr>
+              <p:cNvPr id="31" name="Rounded Rectangle 30">
+                <a:extLst>
+                  <a:ext uri="{FF2B5EF4-FFF2-40B4-BE49-F238E27FC236}">
+                    <a16:creationId xmlns:a16="http://schemas.microsoft.com/office/drawing/2014/main" id="{C5DBB963-E547-4444-A8FF-4FF01146E8E3}"/>
+                  </a:ext>
+                </a:extLst>
+              </p:cNvPr>
+              <p:cNvSpPr/>
+              <p:nvPr/>
+            </p:nvSpPr>
+            <p:spPr>
+              <a:xfrm>
+                <a:off x="1391168" y="2430590"/>
+                <a:ext cx="2286000" cy="2368296"/>
+              </a:xfrm>
+              <a:prstGeom prst="roundRect">
+                <a:avLst/>
+              </a:prstGeom>
+              <a:noFill/>
+              <a:ln w="38100"/>
+            </p:spPr>
+            <p:style>
+              <a:lnRef idx="2">
+                <a:schemeClr val="accent1">
+                  <a:shade val="50000"/>
+                </a:schemeClr>
+              </a:lnRef>
+              <a:fillRef idx="1">
+                <a:schemeClr val="accent1"/>
+              </a:fillRef>
+              <a:effectRef idx="0">
+                <a:schemeClr val="accent1"/>
+              </a:effectRef>
+              <a:fontRef idx="minor">
+                <a:schemeClr val="lt1"/>
+              </a:fontRef>
+            </p:style>
+            <p:txBody>
+              <a:bodyPr rtlCol="0" anchor="ctr"/>
+              <a:lstStyle/>
+              <a:p>
+                <a:pPr algn="ctr"/>
+                <a:endParaRPr lang="en-US"/>
+              </a:p>
+            </p:txBody>
+          </p:sp>
+          <p:sp>
+            <p:nvSpPr>
+              <p:cNvPr id="32" name="Rounded Rectangle 31">
+                <a:extLst>
+                  <a:ext uri="{FF2B5EF4-FFF2-40B4-BE49-F238E27FC236}">
+                    <a16:creationId xmlns:a16="http://schemas.microsoft.com/office/drawing/2014/main" id="{CCF7ED2C-A42C-B240-A0FC-09344FB6390A}"/>
+                  </a:ext>
+                </a:extLst>
+              </p:cNvPr>
+              <p:cNvSpPr/>
+              <p:nvPr/>
+            </p:nvSpPr>
+            <p:spPr>
+              <a:xfrm>
+                <a:off x="1391168" y="2447864"/>
+                <a:ext cx="2286000" cy="322767"/>
+              </a:xfrm>
+              <a:prstGeom prst="roundRect">
+                <a:avLst>
+                  <a:gd name="adj" fmla="val 50000"/>
+                </a:avLst>
+              </a:prstGeom>
+            </p:spPr>
+            <p:style>
+              <a:lnRef idx="2">
+                <a:schemeClr val="accent1">
+                  <a:shade val="50000"/>
+                </a:schemeClr>
+              </a:lnRef>
+              <a:fillRef idx="1">
+                <a:schemeClr val="accent1"/>
+              </a:fillRef>
+              <a:effectRef idx="0">
+                <a:schemeClr val="accent1"/>
+              </a:effectRef>
+              <a:fontRef idx="minor">
+                <a:schemeClr val="lt1"/>
+              </a:fontRef>
+            </p:style>
+            <p:txBody>
+              <a:bodyPr rtlCol="0" anchor="ctr"/>
+              <a:lstStyle/>
+              <a:p>
+                <a:pPr algn="ctr"/>
+                <a:r>
+                  <a:rPr lang="en-US" dirty="0" err="1"/>
+                  <a:t>target.com</a:t>
+                </a:r>
+                <a:r>
+                  <a:rPr lang="en-US" dirty="0"/>
+                  <a:t>/pic/1234</a:t>
+                </a:r>
+              </a:p>
+            </p:txBody>
+          </p:sp>
+        </p:grpSp>
+        <p:cxnSp>
+          <p:nvCxnSpPr>
+            <p:cNvPr id="37" name="Straight Arrow Connector 36">
+              <a:extLst>
+                <a:ext uri="{FF2B5EF4-FFF2-40B4-BE49-F238E27FC236}">
+                  <a16:creationId xmlns:a16="http://schemas.microsoft.com/office/drawing/2014/main" id="{2C9846BD-B74A-BA4E-A594-AF042A63BE8F}"/>
+                </a:ext>
+              </a:extLst>
+            </p:cNvPr>
+            <p:cNvCxnSpPr>
+              <a:cxnSpLocks/>
+              <a:stCxn id="23" idx="3"/>
+              <a:endCxn id="30" idx="1"/>
+            </p:cNvCxnSpPr>
+            <p:nvPr/>
+          </p:nvCxnSpPr>
+          <p:spPr>
+            <a:xfrm flipV="1">
+              <a:off x="2355801" y="2581442"/>
+              <a:ext cx="2979715" cy="13504"/>
+            </a:xfrm>
+            <a:prstGeom prst="straightConnector1">
+              <a:avLst/>
+            </a:prstGeom>
+            <a:ln w="50800">
+              <a:tailEnd type="triangle"/>
+            </a:ln>
+          </p:spPr>
+          <p:style>
+            <a:lnRef idx="1">
+              <a:schemeClr val="accent1"/>
+            </a:lnRef>
+            <a:fillRef idx="0">
+              <a:schemeClr val="accent1"/>
+            </a:fillRef>
+            <a:effectRef idx="0">
+              <a:schemeClr val="accent1"/>
+            </a:effectRef>
+            <a:fontRef idx="minor">
+              <a:schemeClr val="tx1"/>
+            </a:fontRef>
+          </p:style>
+        </p:cxnSp>
+        <p:sp>
+          <p:nvSpPr>
+            <p:cNvPr id="38" name="TextBox 37">
+              <a:extLst>
+                <a:ext uri="{FF2B5EF4-FFF2-40B4-BE49-F238E27FC236}">
+                  <a16:creationId xmlns:a16="http://schemas.microsoft.com/office/drawing/2014/main" id="{1557788C-772E-3D43-9689-65E913D962CC}"/>
+                </a:ext>
+              </a:extLst>
+            </p:cNvPr>
+            <p:cNvSpPr txBox="1"/>
+            <p:nvPr/>
+          </p:nvSpPr>
+          <p:spPr>
+            <a:xfrm>
+              <a:off x="2880001" y="544406"/>
+              <a:ext cx="2036191" cy="523220"/>
+            </a:xfrm>
+            <a:prstGeom prst="rect">
+              <a:avLst/>
+            </a:prstGeom>
+            <a:noFill/>
+          </p:spPr>
+          <p:txBody>
+            <a:bodyPr wrap="square" rtlCol="0">
+              <a:spAutoFit/>
+            </a:bodyPr>
+            <a:lstStyle/>
+            <a:p>
+              <a:r>
+                <a:rPr lang="en-US" sz="2800" dirty="0"/>
+                <a:t>User input</a:t>
+              </a:r>
+            </a:p>
+          </p:txBody>
+        </p:sp>
+        <p:sp>
+          <p:nvSpPr>
+            <p:cNvPr id="39" name="TextBox 38">
+              <a:extLst>
+                <a:ext uri="{FF2B5EF4-FFF2-40B4-BE49-F238E27FC236}">
+                  <a16:creationId xmlns:a16="http://schemas.microsoft.com/office/drawing/2014/main" id="{FF4BB9CB-92F2-CB46-83AA-78BE1F5E0B0A}"/>
+                </a:ext>
+              </a:extLst>
+            </p:cNvPr>
+            <p:cNvSpPr txBox="1"/>
+            <p:nvPr/>
+          </p:nvSpPr>
+          <p:spPr>
+            <a:xfrm>
+              <a:off x="2880001" y="1216492"/>
+              <a:ext cx="1771455" cy="1015663"/>
+            </a:xfrm>
+            <a:prstGeom prst="rect">
+              <a:avLst/>
+            </a:prstGeom>
+            <a:noFill/>
+            <a:ln>
+              <a:noFill/>
+            </a:ln>
+          </p:spPr>
+          <p:txBody>
+            <a:bodyPr wrap="square" rtlCol="0">
+              <a:spAutoFit/>
+            </a:bodyPr>
+            <a:lstStyle/>
+            <a:p>
+              <a:r>
+                <a:rPr lang="en-US" sz="2000" dirty="0"/>
+                <a:t>&lt;script&gt;</a:t>
+              </a:r>
+            </a:p>
+            <a:p>
+              <a:r>
+                <a:rPr lang="en-US" sz="2000" dirty="0"/>
+                <a:t>alert(“XSS”)</a:t>
+              </a:r>
+            </a:p>
+            <a:p>
+              <a:r>
+                <a:rPr lang="en-US" sz="2000" dirty="0"/>
+                <a:t>&lt;/script&gt;</a:t>
+              </a:r>
+            </a:p>
+          </p:txBody>
+        </p:sp>
+        <p:grpSp>
+          <p:nvGrpSpPr>
+            <p:cNvPr id="49" name="Group 48">
+              <a:extLst>
+                <a:ext uri="{FF2B5EF4-FFF2-40B4-BE49-F238E27FC236}">
+                  <a16:creationId xmlns:a16="http://schemas.microsoft.com/office/drawing/2014/main" id="{E2BBB022-6160-5B41-A8E7-590D2C8D11C6}"/>
+                </a:ext>
+              </a:extLst>
+            </p:cNvPr>
+            <p:cNvGrpSpPr/>
+            <p:nvPr/>
+          </p:nvGrpSpPr>
+          <p:grpSpPr>
+            <a:xfrm>
+              <a:off x="8926003" y="666653"/>
+              <a:ext cx="2286000" cy="2368296"/>
+              <a:chOff x="1391168" y="2430590"/>
+              <a:chExt cx="2286000" cy="2368296"/>
+            </a:xfrm>
+          </p:grpSpPr>
+          <p:grpSp>
+            <p:nvGrpSpPr>
+              <p:cNvPr id="50" name="Group 49">
+                <a:extLst>
+                  <a:ext uri="{FF2B5EF4-FFF2-40B4-BE49-F238E27FC236}">
+                    <a16:creationId xmlns:a16="http://schemas.microsoft.com/office/drawing/2014/main" id="{0D0BE95E-3B42-0346-861B-044600354721}"/>
+                  </a:ext>
+                </a:extLst>
+              </p:cNvPr>
+              <p:cNvGrpSpPr/>
+              <p:nvPr/>
+            </p:nvGrpSpPr>
+            <p:grpSpPr>
+              <a:xfrm>
+                <a:off x="2006211" y="2847975"/>
+                <a:ext cx="1055915" cy="903514"/>
+                <a:chOff x="2006211" y="2847975"/>
+                <a:chExt cx="1055915" cy="903514"/>
+              </a:xfrm>
+            </p:grpSpPr>
+            <p:sp>
+              <p:nvSpPr>
+                <p:cNvPr id="55" name="Rounded Rectangle 54">
+                  <a:extLst>
+                    <a:ext uri="{FF2B5EF4-FFF2-40B4-BE49-F238E27FC236}">
+                      <a16:creationId xmlns:a16="http://schemas.microsoft.com/office/drawing/2014/main" id="{67DC9DFE-CCF8-2841-9DD6-B51247CC79D4}"/>
+                    </a:ext>
+                  </a:extLst>
+                </p:cNvPr>
+                <p:cNvSpPr/>
+                <p:nvPr/>
+              </p:nvSpPr>
+              <p:spPr>
+                <a:xfrm>
+                  <a:off x="2006211" y="2847975"/>
+                  <a:ext cx="1055915" cy="903514"/>
+                </a:xfrm>
+                <a:prstGeom prst="roundRect">
+                  <a:avLst/>
+                </a:prstGeom>
+                <a:noFill/>
+                <a:ln w="38100"/>
+              </p:spPr>
+              <p:style>
+                <a:lnRef idx="2">
+                  <a:schemeClr val="accent1">
+                    <a:shade val="50000"/>
+                  </a:schemeClr>
+                </a:lnRef>
+                <a:fillRef idx="1">
+                  <a:schemeClr val="accent1"/>
+                </a:fillRef>
+                <a:effectRef idx="0">
+                  <a:schemeClr val="accent1"/>
+                </a:effectRef>
+                <a:fontRef idx="minor">
+                  <a:schemeClr val="lt1"/>
+                </a:fontRef>
+              </p:style>
+              <p:txBody>
+                <a:bodyPr rtlCol="0" anchor="ctr"/>
+                <a:lstStyle/>
+                <a:p>
+                  <a:pPr algn="ctr"/>
+                  <a:endParaRPr lang="en-US" dirty="0"/>
+                </a:p>
+              </p:txBody>
+            </p:sp>
+            <p:sp>
+              <p:nvSpPr>
+                <p:cNvPr id="56" name="Trapezoid 55">
+                  <a:extLst>
+                    <a:ext uri="{FF2B5EF4-FFF2-40B4-BE49-F238E27FC236}">
+                      <a16:creationId xmlns:a16="http://schemas.microsoft.com/office/drawing/2014/main" id="{8A3EC681-6499-6B49-8700-20B1DF4C1714}"/>
+                    </a:ext>
+                  </a:extLst>
+                </p:cNvPr>
+                <p:cNvSpPr/>
+                <p:nvPr/>
+              </p:nvSpPr>
+              <p:spPr>
+                <a:xfrm>
+                  <a:off x="2257425" y="3299732"/>
+                  <a:ext cx="528638" cy="315006"/>
+                </a:xfrm>
+                <a:prstGeom prst="trapezoid">
+                  <a:avLst/>
+                </a:prstGeom>
+                <a:ln>
+                  <a:noFill/>
+                </a:ln>
+              </p:spPr>
+              <p:style>
+                <a:lnRef idx="2">
+                  <a:schemeClr val="accent1">
+                    <a:shade val="50000"/>
+                  </a:schemeClr>
+                </a:lnRef>
+                <a:fillRef idx="1">
+                  <a:schemeClr val="accent1"/>
+                </a:fillRef>
+                <a:effectRef idx="0">
+                  <a:schemeClr val="accent1"/>
+                </a:effectRef>
+                <a:fontRef idx="minor">
+                  <a:schemeClr val="lt1"/>
+                </a:fontRef>
+              </p:style>
+              <p:txBody>
+                <a:bodyPr rtlCol="0" anchor="ctr"/>
+                <a:lstStyle/>
+                <a:p>
+                  <a:pPr algn="ctr"/>
+                  <a:endParaRPr lang="en-US"/>
+                </a:p>
+              </p:txBody>
+            </p:sp>
+            <p:sp>
+              <p:nvSpPr>
+                <p:cNvPr id="57" name="Teardrop 56">
+                  <a:extLst>
+                    <a:ext uri="{FF2B5EF4-FFF2-40B4-BE49-F238E27FC236}">
+                      <a16:creationId xmlns:a16="http://schemas.microsoft.com/office/drawing/2014/main" id="{0D5DF5E4-8034-A746-81B6-5F05C334E9EC}"/>
+                    </a:ext>
+                  </a:extLst>
+                </p:cNvPr>
+                <p:cNvSpPr/>
+                <p:nvPr/>
+              </p:nvSpPr>
+              <p:spPr>
+                <a:xfrm>
+                  <a:off x="2370706" y="3005819"/>
+                  <a:ext cx="310924" cy="314324"/>
+                </a:xfrm>
+                <a:prstGeom prst="teardrop">
+                  <a:avLst>
+                    <a:gd name="adj" fmla="val 118708"/>
+                  </a:avLst>
+                </a:prstGeom>
+                <a:ln>
+                  <a:noFill/>
+                </a:ln>
+              </p:spPr>
+              <p:style>
+                <a:lnRef idx="2">
+                  <a:schemeClr val="accent1">
+                    <a:shade val="50000"/>
+                  </a:schemeClr>
+                </a:lnRef>
+                <a:fillRef idx="1">
+                  <a:schemeClr val="accent1"/>
+                </a:fillRef>
+                <a:effectRef idx="0">
+                  <a:schemeClr val="accent1"/>
+                </a:effectRef>
+                <a:fontRef idx="minor">
+                  <a:schemeClr val="lt1"/>
+                </a:fontRef>
+              </p:style>
+              <p:txBody>
+                <a:bodyPr rtlCol="0" anchor="ctr"/>
+                <a:lstStyle/>
+                <a:p>
+                  <a:pPr algn="ctr"/>
+                  <a:endParaRPr lang="en-US"/>
+                </a:p>
+              </p:txBody>
+            </p:sp>
+          </p:grpSp>
+          <p:sp>
+            <p:nvSpPr>
+              <p:cNvPr id="51" name="TextBox 50">
+                <a:extLst>
+                  <a:ext uri="{FF2B5EF4-FFF2-40B4-BE49-F238E27FC236}">
+                    <a16:creationId xmlns:a16="http://schemas.microsoft.com/office/drawing/2014/main" id="{69574A4E-05D6-8A4E-A59A-31720AB8F6F9}"/>
+                  </a:ext>
+                </a:extLst>
+              </p:cNvPr>
+              <p:cNvSpPr txBox="1"/>
+              <p:nvPr/>
+            </p:nvSpPr>
+            <p:spPr>
+              <a:xfrm>
+                <a:off x="1904513" y="3804885"/>
+                <a:ext cx="1640046" cy="338554"/>
+              </a:xfrm>
+              <a:prstGeom prst="rect">
+                <a:avLst/>
+              </a:prstGeom>
+              <a:noFill/>
+            </p:spPr>
+            <p:txBody>
+              <a:bodyPr wrap="square" rtlCol="0">
+                <a:spAutoFit/>
+              </a:bodyPr>
+              <a:lstStyle/>
+              <a:p>
+                <a:r>
+                  <a:rPr lang="en-US" sz="1600" dirty="0"/>
+                  <a:t>Eve: Great hair!</a:t>
+                </a:r>
+              </a:p>
+            </p:txBody>
+          </p:sp>
+          <p:sp>
+            <p:nvSpPr>
+              <p:cNvPr id="53" name="Rounded Rectangle 52">
+                <a:extLst>
+                  <a:ext uri="{FF2B5EF4-FFF2-40B4-BE49-F238E27FC236}">
+                    <a16:creationId xmlns:a16="http://schemas.microsoft.com/office/drawing/2014/main" id="{7D6A4D62-3065-3244-9A0F-5DB2B71C3794}"/>
+                  </a:ext>
+                </a:extLst>
+              </p:cNvPr>
+              <p:cNvSpPr/>
+              <p:nvPr/>
+            </p:nvSpPr>
+            <p:spPr>
+              <a:xfrm>
+                <a:off x="1391168" y="2430590"/>
+                <a:ext cx="2286000" cy="2368296"/>
+              </a:xfrm>
+              <a:prstGeom prst="roundRect">
+                <a:avLst/>
+              </a:prstGeom>
+              <a:noFill/>
+              <a:ln w="38100"/>
+            </p:spPr>
+            <p:style>
+              <a:lnRef idx="2">
+                <a:schemeClr val="accent1">
+                  <a:shade val="50000"/>
+                </a:schemeClr>
+              </a:lnRef>
+              <a:fillRef idx="1">
+                <a:schemeClr val="accent1"/>
+              </a:fillRef>
+              <a:effectRef idx="0">
+                <a:schemeClr val="accent1"/>
+              </a:effectRef>
+              <a:fontRef idx="minor">
+                <a:schemeClr val="lt1"/>
+              </a:fontRef>
+            </p:style>
+            <p:txBody>
+              <a:bodyPr rtlCol="0" anchor="ctr"/>
+              <a:lstStyle/>
+              <a:p>
+                <a:pPr algn="ctr"/>
+                <a:endParaRPr lang="en-US"/>
+              </a:p>
+            </p:txBody>
+          </p:sp>
+          <p:sp>
+            <p:nvSpPr>
+              <p:cNvPr id="54" name="Rounded Rectangle 53">
+                <a:extLst>
+                  <a:ext uri="{FF2B5EF4-FFF2-40B4-BE49-F238E27FC236}">
+                    <a16:creationId xmlns:a16="http://schemas.microsoft.com/office/drawing/2014/main" id="{7E4A5140-D226-2543-8F00-12304FE848A9}"/>
+                  </a:ext>
+                </a:extLst>
+              </p:cNvPr>
+              <p:cNvSpPr/>
+              <p:nvPr/>
+            </p:nvSpPr>
+            <p:spPr>
+              <a:xfrm>
+                <a:off x="1391168" y="2447864"/>
+                <a:ext cx="2286000" cy="322767"/>
+              </a:xfrm>
+              <a:prstGeom prst="roundRect">
+                <a:avLst>
+                  <a:gd name="adj" fmla="val 50000"/>
+                </a:avLst>
+              </a:prstGeom>
+            </p:spPr>
+            <p:style>
+              <a:lnRef idx="2">
+                <a:schemeClr val="accent1">
+                  <a:shade val="50000"/>
+                </a:schemeClr>
+              </a:lnRef>
+              <a:fillRef idx="1">
+                <a:schemeClr val="accent1"/>
+              </a:fillRef>
+              <a:effectRef idx="0">
+                <a:schemeClr val="accent1"/>
+              </a:effectRef>
+              <a:fontRef idx="minor">
+                <a:schemeClr val="lt1"/>
+              </a:fontRef>
+            </p:style>
+            <p:txBody>
+              <a:bodyPr rtlCol="0" anchor="ctr"/>
+              <a:lstStyle/>
+              <a:p>
+                <a:pPr algn="ctr"/>
+                <a:r>
+                  <a:rPr lang="en-US" dirty="0" err="1"/>
+                  <a:t>target.com</a:t>
+                </a:r>
+                <a:r>
+                  <a:rPr lang="en-US" dirty="0"/>
+                  <a:t>/pic/1234</a:t>
+                </a:r>
+              </a:p>
+            </p:txBody>
+          </p:sp>
+        </p:grpSp>
+        <p:sp>
+          <p:nvSpPr>
+            <p:cNvPr id="58" name="TextBox 57">
+              <a:extLst>
+                <a:ext uri="{FF2B5EF4-FFF2-40B4-BE49-F238E27FC236}">
+                  <a16:creationId xmlns:a16="http://schemas.microsoft.com/office/drawing/2014/main" id="{DC50779F-E492-234B-88E0-2078F8B78CB2}"/>
+                </a:ext>
+              </a:extLst>
+            </p:cNvPr>
+            <p:cNvSpPr txBox="1"/>
+            <p:nvPr/>
+          </p:nvSpPr>
+          <p:spPr>
+            <a:xfrm>
+              <a:off x="8926003" y="2302558"/>
+              <a:ext cx="2305268" cy="584775"/>
+            </a:xfrm>
+            <a:prstGeom prst="rect">
+              <a:avLst/>
+            </a:prstGeom>
+            <a:noFill/>
+          </p:spPr>
+          <p:txBody>
+            <a:bodyPr wrap="square" rtlCol="0">
+              <a:spAutoFit/>
+            </a:bodyPr>
+            <a:lstStyle/>
+            <a:p>
+              <a:pPr algn="ctr"/>
+              <a:r>
+                <a:rPr lang="en-US" sz="1600" b="1" dirty="0">
+                  <a:solidFill>
+                    <a:srgbClr val="FF0000"/>
+                  </a:solidFill>
+                </a:rPr>
+                <a:t>Invalid user input! Please try again</a:t>
+              </a:r>
+            </a:p>
+          </p:txBody>
+        </p:sp>
+        <p:sp>
+          <p:nvSpPr>
+            <p:cNvPr id="59" name="Right Arrow 58">
+              <a:extLst>
+                <a:ext uri="{FF2B5EF4-FFF2-40B4-BE49-F238E27FC236}">
+                  <a16:creationId xmlns:a16="http://schemas.microsoft.com/office/drawing/2014/main" id="{CFA78492-5030-FF47-99ED-D9F648566FAE}"/>
+                </a:ext>
+              </a:extLst>
+            </p:cNvPr>
+            <p:cNvSpPr/>
+            <p:nvPr/>
+          </p:nvSpPr>
+          <p:spPr>
+            <a:xfrm>
+              <a:off x="7108171" y="1808108"/>
+              <a:ext cx="1817832" cy="291915"/>
+            </a:xfrm>
+            <a:prstGeom prst="rightArrow">
+              <a:avLst/>
+            </a:prstGeom>
+            <a:ln w="50800" cap="rnd">
+              <a:noFill/>
+            </a:ln>
+          </p:spPr>
+          <p:style>
+            <a:lnRef idx="2">
+              <a:schemeClr val="accent1">
+                <a:shade val="50000"/>
+              </a:schemeClr>
+            </a:lnRef>
+            <a:fillRef idx="1">
+              <a:schemeClr val="accent1"/>
+            </a:fillRef>
+            <a:effectRef idx="0">
+              <a:schemeClr val="accent1"/>
+            </a:effectRef>
+            <a:fontRef idx="minor">
+              <a:schemeClr val="lt1"/>
+            </a:fontRef>
+          </p:style>
+          <p:txBody>
+            <a:bodyPr rtlCol="0" anchor="ctr"/>
+            <a:lstStyle/>
+            <a:p>
+              <a:pPr algn="ctr"/>
+              <a:endParaRPr lang="en-US"/>
+            </a:p>
+          </p:txBody>
+        </p:sp>
+      </p:grpSp>
+      <p:grpSp>
+        <p:nvGrpSpPr>
+          <p:cNvPr id="62" name="Group 61">
+            <a:extLst>
+              <a:ext uri="{FF2B5EF4-FFF2-40B4-BE49-F238E27FC236}">
+                <a16:creationId xmlns:a16="http://schemas.microsoft.com/office/drawing/2014/main" id="{3D649E60-C24F-E54E-8613-D899820F2C95}"/>
+              </a:ext>
+            </a:extLst>
+          </p:cNvPr>
+          <p:cNvGrpSpPr/>
+          <p:nvPr/>
+        </p:nvGrpSpPr>
+        <p:grpSpPr>
+          <a:xfrm>
+            <a:off x="1139801" y="-295175"/>
+            <a:ext cx="798570" cy="753224"/>
+            <a:chOff x="3415553" y="3805518"/>
+            <a:chExt cx="1406618" cy="1196788"/>
+          </a:xfrm>
+        </p:grpSpPr>
+        <p:sp>
+          <p:nvSpPr>
+            <p:cNvPr id="60" name="Oval 59">
+              <a:extLst>
+                <a:ext uri="{FF2B5EF4-FFF2-40B4-BE49-F238E27FC236}">
+                  <a16:creationId xmlns:a16="http://schemas.microsoft.com/office/drawing/2014/main" id="{558C845D-16C1-AB40-90E7-EC716C4E0270}"/>
+                </a:ext>
+              </a:extLst>
+            </p:cNvPr>
+            <p:cNvSpPr/>
+            <p:nvPr/>
+          </p:nvSpPr>
+          <p:spPr>
+            <a:xfrm>
+              <a:off x="3415553" y="3805518"/>
+              <a:ext cx="1406618" cy="1196788"/>
+            </a:xfrm>
+            <a:prstGeom prst="ellipse">
+              <a:avLst/>
+            </a:prstGeom>
+            <a:noFill/>
+            <a:ln w="50800">
+              <a:solidFill>
+                <a:schemeClr val="bg2">
+                  <a:lumMod val="50000"/>
+                </a:schemeClr>
+              </a:solidFill>
+            </a:ln>
+          </p:spPr>
+          <p:style>
+            <a:lnRef idx="2">
+              <a:schemeClr val="accent1">
+                <a:shade val="50000"/>
+              </a:schemeClr>
+            </a:lnRef>
+            <a:fillRef idx="1">
+              <a:schemeClr val="accent1"/>
+            </a:fillRef>
+            <a:effectRef idx="0">
+              <a:schemeClr val="accent1"/>
+            </a:effectRef>
+            <a:fontRef idx="minor">
+              <a:schemeClr val="lt1"/>
+            </a:fontRef>
+          </p:style>
+          <p:txBody>
+            <a:bodyPr rtlCol="0" anchor="ctr"/>
+            <a:lstStyle/>
+            <a:p>
+              <a:pPr algn="ctr"/>
+              <a:endParaRPr lang="en-US"/>
+            </a:p>
+          </p:txBody>
+        </p:sp>
+        <p:sp>
+          <p:nvSpPr>
+            <p:cNvPr id="61" name="Oval 60">
+              <a:extLst>
+                <a:ext uri="{FF2B5EF4-FFF2-40B4-BE49-F238E27FC236}">
+                  <a16:creationId xmlns:a16="http://schemas.microsoft.com/office/drawing/2014/main" id="{AD8F0598-43AE-FA4E-8539-38C63413F254}"/>
+                </a:ext>
+              </a:extLst>
+            </p:cNvPr>
+            <p:cNvSpPr/>
+            <p:nvPr/>
+          </p:nvSpPr>
+          <p:spPr>
+            <a:xfrm>
+              <a:off x="3536576" y="3896099"/>
+              <a:ext cx="1178019" cy="1021592"/>
+            </a:xfrm>
+            <a:prstGeom prst="ellipse">
+              <a:avLst/>
+            </a:prstGeom>
+            <a:solidFill>
+              <a:srgbClr val="FF0000"/>
+            </a:solidFill>
+            <a:ln w="50800">
+              <a:noFill/>
+            </a:ln>
+          </p:spPr>
+          <p:style>
+            <a:lnRef idx="2">
+              <a:schemeClr val="accent1">
+                <a:shade val="50000"/>
+              </a:schemeClr>
+            </a:lnRef>
+            <a:fillRef idx="1">
+              <a:schemeClr val="accent1"/>
+            </a:fillRef>
+            <a:effectRef idx="0">
+              <a:schemeClr val="accent1"/>
+            </a:effectRef>
+            <a:fontRef idx="minor">
+              <a:schemeClr val="lt1"/>
+            </a:fontRef>
+          </p:style>
+          <p:txBody>
+            <a:bodyPr rtlCol="0" anchor="ctr"/>
+            <a:lstStyle/>
+            <a:p>
+              <a:pPr algn="ctr"/>
+              <a:endParaRPr lang="en-US"/>
+            </a:p>
+          </p:txBody>
+        </p:sp>
+      </p:grpSp>
+      <p:grpSp>
+        <p:nvGrpSpPr>
+          <p:cNvPr id="67" name="Group 66">
+            <a:extLst>
+              <a:ext uri="{FF2B5EF4-FFF2-40B4-BE49-F238E27FC236}">
+                <a16:creationId xmlns:a16="http://schemas.microsoft.com/office/drawing/2014/main" id="{A3E78CA3-DFE4-C548-B6EC-87A978FD630E}"/>
+              </a:ext>
+            </a:extLst>
+          </p:cNvPr>
+          <p:cNvGrpSpPr/>
+          <p:nvPr/>
+        </p:nvGrpSpPr>
+        <p:grpSpPr>
+          <a:xfrm>
+            <a:off x="9616953" y="-295175"/>
+            <a:ext cx="879252" cy="788343"/>
+            <a:chOff x="3316230" y="4066044"/>
+            <a:chExt cx="879252" cy="788343"/>
+          </a:xfrm>
+        </p:grpSpPr>
+        <p:sp>
+          <p:nvSpPr>
+            <p:cNvPr id="64" name="Oval 63">
+              <a:extLst>
+                <a:ext uri="{FF2B5EF4-FFF2-40B4-BE49-F238E27FC236}">
+                  <a16:creationId xmlns:a16="http://schemas.microsoft.com/office/drawing/2014/main" id="{7F0ACD43-EB44-0C40-9C59-C03E3C5EFC99}"/>
+                </a:ext>
+              </a:extLst>
+            </p:cNvPr>
+            <p:cNvSpPr/>
+            <p:nvPr/>
+          </p:nvSpPr>
+          <p:spPr>
+            <a:xfrm>
+              <a:off x="3316230" y="4066044"/>
+              <a:ext cx="879252" cy="788343"/>
+            </a:xfrm>
+            <a:prstGeom prst="ellipse">
+              <a:avLst/>
+            </a:prstGeom>
+            <a:noFill/>
+            <a:ln w="50800">
+              <a:solidFill>
+                <a:schemeClr val="bg2">
+                  <a:lumMod val="50000"/>
+                </a:schemeClr>
+              </a:solidFill>
+            </a:ln>
+          </p:spPr>
+          <p:style>
+            <a:lnRef idx="2">
+              <a:schemeClr val="accent1">
+                <a:shade val="50000"/>
+              </a:schemeClr>
+            </a:lnRef>
+            <a:fillRef idx="1">
+              <a:schemeClr val="accent1"/>
+            </a:fillRef>
+            <a:effectRef idx="0">
+              <a:schemeClr val="accent1"/>
+            </a:effectRef>
+            <a:fontRef idx="minor">
+              <a:schemeClr val="lt1"/>
+            </a:fontRef>
+          </p:style>
+          <p:txBody>
+            <a:bodyPr rtlCol="0" anchor="ctr"/>
+            <a:lstStyle/>
+            <a:p>
+              <a:pPr algn="ctr"/>
+              <a:endParaRPr lang="en-US"/>
+            </a:p>
+          </p:txBody>
+        </p:sp>
+        <p:sp>
+          <p:nvSpPr>
+            <p:cNvPr id="66" name="Rectangle 65">
+              <a:extLst>
+                <a:ext uri="{FF2B5EF4-FFF2-40B4-BE49-F238E27FC236}">
+                  <a16:creationId xmlns:a16="http://schemas.microsoft.com/office/drawing/2014/main" id="{C8F84293-1729-8847-903E-E79427D80A1A}"/>
+                </a:ext>
+              </a:extLst>
+            </p:cNvPr>
+            <p:cNvSpPr/>
+            <p:nvPr/>
+          </p:nvSpPr>
+          <p:spPr>
+            <a:xfrm>
+              <a:off x="3482788" y="4226748"/>
+              <a:ext cx="537387" cy="452828"/>
+            </a:xfrm>
+            <a:prstGeom prst="rect">
+              <a:avLst/>
+            </a:prstGeom>
+            <a:solidFill>
+              <a:srgbClr val="FF0000"/>
+            </a:solidFill>
+            <a:ln>
+              <a:noFill/>
+            </a:ln>
+          </p:spPr>
+          <p:style>
+            <a:lnRef idx="2">
+              <a:schemeClr val="accent1">
+                <a:shade val="50000"/>
+              </a:schemeClr>
+            </a:lnRef>
+            <a:fillRef idx="1">
+              <a:schemeClr val="accent1"/>
+            </a:fillRef>
+            <a:effectRef idx="0">
+              <a:schemeClr val="accent1"/>
+            </a:effectRef>
+            <a:fontRef idx="minor">
+              <a:schemeClr val="lt1"/>
+            </a:fontRef>
+          </p:style>
+          <p:txBody>
+            <a:bodyPr rtlCol="0" anchor="ctr"/>
+            <a:lstStyle/>
+            <a:p>
+              <a:pPr algn="ctr"/>
+              <a:endParaRPr lang="en-US" dirty="0"/>
+            </a:p>
+          </p:txBody>
+        </p:sp>
+      </p:grpSp>
+      <p:cxnSp>
+        <p:nvCxnSpPr>
+          <p:cNvPr id="70" name="Straight Arrow Connector 69">
+            <a:extLst>
+              <a:ext uri="{FF2B5EF4-FFF2-40B4-BE49-F238E27FC236}">
+                <a16:creationId xmlns:a16="http://schemas.microsoft.com/office/drawing/2014/main" id="{FDF88A69-F872-5A42-9048-6D825EE5371F}"/>
+              </a:ext>
+            </a:extLst>
+          </p:cNvPr>
+          <p:cNvCxnSpPr>
+            <a:stCxn id="60" idx="6"/>
+            <a:endCxn id="64" idx="2"/>
+          </p:cNvCxnSpPr>
+          <p:nvPr/>
+        </p:nvCxnSpPr>
+        <p:spPr>
+          <a:xfrm>
+            <a:off x="1938371" y="81437"/>
+            <a:ext cx="7678582" cy="17560"/>
+          </a:xfrm>
+          <a:prstGeom prst="straightConnector1">
+            <a:avLst/>
+          </a:prstGeom>
+          <a:ln w="63500">
+            <a:solidFill>
+              <a:srgbClr val="C42C18"/>
+            </a:solidFill>
+            <a:prstDash val="dash"/>
+            <a:tailEnd type="triangle"/>
+          </a:ln>
+        </p:spPr>
+        <p:style>
+          <a:lnRef idx="1">
+            <a:schemeClr val="accent1"/>
+          </a:lnRef>
+          <a:fillRef idx="0">
+            <a:schemeClr val="accent1"/>
+          </a:fillRef>
+          <a:effectRef idx="0">
+            <a:schemeClr val="accent1"/>
+          </a:effectRef>
+          <a:fontRef idx="minor">
+            <a:schemeClr val="tx1"/>
+          </a:fontRef>
+        </p:style>
+      </p:cxnSp>
+      <p:sp>
+        <p:nvSpPr>
+          <p:cNvPr id="71" name="TextBox 70">
+            <a:extLst>
+              <a:ext uri="{FF2B5EF4-FFF2-40B4-BE49-F238E27FC236}">
+                <a16:creationId xmlns:a16="http://schemas.microsoft.com/office/drawing/2014/main" id="{BED31191-B4C8-1A43-BFCC-084076031832}"/>
+              </a:ext>
+            </a:extLst>
+          </p:cNvPr>
+          <p:cNvSpPr txBox="1"/>
+          <p:nvPr/>
+        </p:nvSpPr>
+        <p:spPr>
+          <a:xfrm>
+            <a:off x="2887178" y="-492022"/>
+            <a:ext cx="8782447" cy="523220"/>
+          </a:xfrm>
+          <a:prstGeom prst="rect">
+            <a:avLst/>
+          </a:prstGeom>
+          <a:noFill/>
+        </p:spPr>
+        <p:txBody>
+          <a:bodyPr wrap="square" rtlCol="0">
+            <a:spAutoFit/>
+          </a:bodyPr>
+          <a:lstStyle/>
+          <a:p>
+            <a:r>
+              <a:rPr lang="en-US" sz="2800" dirty="0"/>
+              <a:t>Record user to application interactions</a:t>
+            </a:r>
+          </a:p>
+        </p:txBody>
+      </p:sp>
+      <p:grpSp>
+        <p:nvGrpSpPr>
+          <p:cNvPr id="202" name="Group 201">
+            <a:extLst>
+              <a:ext uri="{FF2B5EF4-FFF2-40B4-BE49-F238E27FC236}">
+                <a16:creationId xmlns:a16="http://schemas.microsoft.com/office/drawing/2014/main" id="{E26D0017-E44E-534A-BA21-3558BB7C9094}"/>
+              </a:ext>
+            </a:extLst>
+          </p:cNvPr>
+          <p:cNvGrpSpPr/>
+          <p:nvPr/>
+        </p:nvGrpSpPr>
+        <p:grpSpPr>
+          <a:xfrm>
+            <a:off x="369703" y="2987049"/>
+            <a:ext cx="10815917" cy="4136185"/>
+            <a:chOff x="306950" y="2059573"/>
+            <a:chExt cx="10815917" cy="4136185"/>
+          </a:xfrm>
+        </p:grpSpPr>
+        <p:grpSp>
+          <p:nvGrpSpPr>
+            <p:cNvPr id="166" name="Group 165">
+              <a:extLst>
+                <a:ext uri="{FF2B5EF4-FFF2-40B4-BE49-F238E27FC236}">
+                  <a16:creationId xmlns:a16="http://schemas.microsoft.com/office/drawing/2014/main" id="{2B255783-43B6-5541-88E6-A8F0A5324AB1}"/>
+                </a:ext>
+              </a:extLst>
+            </p:cNvPr>
+            <p:cNvGrpSpPr/>
+            <p:nvPr/>
+          </p:nvGrpSpPr>
+          <p:grpSpPr>
+            <a:xfrm>
+              <a:off x="306950" y="3366391"/>
+              <a:ext cx="10815917" cy="2829367"/>
+              <a:chOff x="396086" y="222856"/>
+              <a:chExt cx="10815917" cy="2829367"/>
+            </a:xfrm>
+          </p:grpSpPr>
+          <p:grpSp>
+            <p:nvGrpSpPr>
+              <p:cNvPr id="167" name="Group 166">
+                <a:extLst>
+                  <a:ext uri="{FF2B5EF4-FFF2-40B4-BE49-F238E27FC236}">
+                    <a16:creationId xmlns:a16="http://schemas.microsoft.com/office/drawing/2014/main" id="{FC3C50B0-71E8-C14D-85ED-D3ECCE45969E}"/>
+                  </a:ext>
+                </a:extLst>
+              </p:cNvPr>
+              <p:cNvGrpSpPr/>
+              <p:nvPr/>
+            </p:nvGrpSpPr>
+            <p:grpSpPr>
+              <a:xfrm>
+                <a:off x="396086" y="666653"/>
+                <a:ext cx="2286000" cy="2368296"/>
+                <a:chOff x="1391168" y="2430590"/>
+                <a:chExt cx="2286000" cy="2368296"/>
+              </a:xfrm>
+            </p:grpSpPr>
+            <p:grpSp>
+              <p:nvGrpSpPr>
+                <p:cNvPr id="190" name="Group 189">
+                  <a:extLst>
+                    <a:ext uri="{FF2B5EF4-FFF2-40B4-BE49-F238E27FC236}">
+                      <a16:creationId xmlns:a16="http://schemas.microsoft.com/office/drawing/2014/main" id="{0B92C133-0B68-734D-8921-11EC22C39515}"/>
+                    </a:ext>
+                  </a:extLst>
+                </p:cNvPr>
+                <p:cNvGrpSpPr/>
+                <p:nvPr/>
+              </p:nvGrpSpPr>
+              <p:grpSpPr>
+                <a:xfrm>
+                  <a:off x="2006211" y="2847975"/>
+                  <a:ext cx="1055915" cy="903514"/>
+                  <a:chOff x="2006211" y="2847975"/>
+                  <a:chExt cx="1055915" cy="903514"/>
+                </a:xfrm>
+              </p:grpSpPr>
+              <p:sp>
+                <p:nvSpPr>
+                  <p:cNvPr id="195" name="Rounded Rectangle 194">
+                    <a:extLst>
+                      <a:ext uri="{FF2B5EF4-FFF2-40B4-BE49-F238E27FC236}">
+                        <a16:creationId xmlns:a16="http://schemas.microsoft.com/office/drawing/2014/main" id="{6338CECA-9AFF-A24F-B17D-61755B92FD5E}"/>
+                      </a:ext>
+                    </a:extLst>
+                  </p:cNvPr>
+                  <p:cNvSpPr/>
+                  <p:nvPr/>
+                </p:nvSpPr>
+                <p:spPr>
+                  <a:xfrm>
+                    <a:off x="2006211" y="2847975"/>
+                    <a:ext cx="1055915" cy="903514"/>
+                  </a:xfrm>
+                  <a:prstGeom prst="roundRect">
+                    <a:avLst/>
+                  </a:prstGeom>
+                  <a:noFill/>
+                  <a:ln w="38100"/>
+                </p:spPr>
+                <p:style>
+                  <a:lnRef idx="2">
+                    <a:schemeClr val="accent1">
+                      <a:shade val="50000"/>
+                    </a:schemeClr>
+                  </a:lnRef>
+                  <a:fillRef idx="1">
+                    <a:schemeClr val="accent1"/>
+                  </a:fillRef>
+                  <a:effectRef idx="0">
+                    <a:schemeClr val="accent1"/>
+                  </a:effectRef>
+                  <a:fontRef idx="minor">
+                    <a:schemeClr val="lt1"/>
+                  </a:fontRef>
+                </p:style>
+                <p:txBody>
+                  <a:bodyPr rtlCol="0" anchor="ctr"/>
+                  <a:lstStyle/>
+                  <a:p>
+                    <a:pPr algn="ctr"/>
+                    <a:endParaRPr lang="en-US" dirty="0"/>
+                  </a:p>
+                </p:txBody>
+              </p:sp>
+              <p:sp>
+                <p:nvSpPr>
+                  <p:cNvPr id="196" name="Trapezoid 195">
+                    <a:extLst>
+                      <a:ext uri="{FF2B5EF4-FFF2-40B4-BE49-F238E27FC236}">
+                        <a16:creationId xmlns:a16="http://schemas.microsoft.com/office/drawing/2014/main" id="{EE5B237D-0126-B842-AEAB-7453AE8B8F34}"/>
+                      </a:ext>
+                    </a:extLst>
+                  </p:cNvPr>
+                  <p:cNvSpPr/>
+                  <p:nvPr/>
+                </p:nvSpPr>
+                <p:spPr>
+                  <a:xfrm>
+                    <a:off x="2257425" y="3299732"/>
+                    <a:ext cx="528638" cy="315006"/>
+                  </a:xfrm>
+                  <a:prstGeom prst="trapezoid">
+                    <a:avLst/>
+                  </a:prstGeom>
+                  <a:ln>
+                    <a:noFill/>
+                  </a:ln>
+                </p:spPr>
+                <p:style>
+                  <a:lnRef idx="2">
+                    <a:schemeClr val="accent1">
+                      <a:shade val="50000"/>
+                    </a:schemeClr>
+                  </a:lnRef>
+                  <a:fillRef idx="1">
+                    <a:schemeClr val="accent1"/>
+                  </a:fillRef>
+                  <a:effectRef idx="0">
+                    <a:schemeClr val="accent1"/>
+                  </a:effectRef>
+                  <a:fontRef idx="minor">
+                    <a:schemeClr val="lt1"/>
+                  </a:fontRef>
+                </p:style>
+                <p:txBody>
+                  <a:bodyPr rtlCol="0" anchor="ctr"/>
+                  <a:lstStyle/>
+                  <a:p>
+                    <a:pPr algn="ctr"/>
+                    <a:endParaRPr lang="en-US"/>
+                  </a:p>
+                </p:txBody>
+              </p:sp>
+              <p:sp>
+                <p:nvSpPr>
+                  <p:cNvPr id="197" name="Teardrop 196">
+                    <a:extLst>
+                      <a:ext uri="{FF2B5EF4-FFF2-40B4-BE49-F238E27FC236}">
+                        <a16:creationId xmlns:a16="http://schemas.microsoft.com/office/drawing/2014/main" id="{70C0ABD1-27CA-854C-BA4A-738EEF65177B}"/>
+                      </a:ext>
+                    </a:extLst>
+                  </p:cNvPr>
+                  <p:cNvSpPr/>
+                  <p:nvPr/>
+                </p:nvSpPr>
+                <p:spPr>
+                  <a:xfrm>
+                    <a:off x="2370706" y="3005819"/>
+                    <a:ext cx="310924" cy="314324"/>
+                  </a:xfrm>
+                  <a:prstGeom prst="teardrop">
+                    <a:avLst>
+                      <a:gd name="adj" fmla="val 118708"/>
+                    </a:avLst>
+                  </a:prstGeom>
+                  <a:ln>
+                    <a:noFill/>
+                  </a:ln>
+                </p:spPr>
+                <p:style>
+                  <a:lnRef idx="2">
+                    <a:schemeClr val="accent1">
+                      <a:shade val="50000"/>
+                    </a:schemeClr>
+                  </a:lnRef>
+                  <a:fillRef idx="1">
+                    <a:schemeClr val="accent1"/>
+                  </a:fillRef>
+                  <a:effectRef idx="0">
+                    <a:schemeClr val="accent1"/>
+                  </a:effectRef>
+                  <a:fontRef idx="minor">
+                    <a:schemeClr val="lt1"/>
+                  </a:fontRef>
+                </p:style>
+                <p:txBody>
+                  <a:bodyPr rtlCol="0" anchor="ctr"/>
+                  <a:lstStyle/>
+                  <a:p>
+                    <a:pPr algn="ctr"/>
+                    <a:endParaRPr lang="en-US"/>
+                  </a:p>
+                </p:txBody>
+              </p:sp>
+            </p:grpSp>
+            <p:sp>
+              <p:nvSpPr>
+                <p:cNvPr id="191" name="TextBox 190">
+                  <a:extLst>
+                    <a:ext uri="{FF2B5EF4-FFF2-40B4-BE49-F238E27FC236}">
+                      <a16:creationId xmlns:a16="http://schemas.microsoft.com/office/drawing/2014/main" id="{76D2909E-E2BD-D94E-8614-0BB82504D93B}"/>
+                    </a:ext>
+                  </a:extLst>
+                </p:cNvPr>
+                <p:cNvSpPr txBox="1"/>
+                <p:nvPr/>
+              </p:nvSpPr>
+              <p:spPr>
+                <a:xfrm>
+                  <a:off x="1904513" y="3804885"/>
+                  <a:ext cx="1157613" cy="261610"/>
+                </a:xfrm>
+                <a:prstGeom prst="rect">
+                  <a:avLst/>
+                </a:prstGeom>
+                <a:noFill/>
+              </p:spPr>
+              <p:txBody>
+                <a:bodyPr wrap="square" rtlCol="0">
+                  <a:spAutoFit/>
+                </a:bodyPr>
+                <a:lstStyle/>
+                <a:p>
+                  <a:r>
+                    <a:rPr lang="en-US" sz="1100" dirty="0"/>
+                    <a:t>Eve: Great hair!</a:t>
+                  </a:r>
+                </a:p>
+              </p:txBody>
+            </p:sp>
+            <p:sp>
+              <p:nvSpPr>
+                <p:cNvPr id="192" name="TextBox 191">
+                  <a:extLst>
+                    <a:ext uri="{FF2B5EF4-FFF2-40B4-BE49-F238E27FC236}">
+                      <a16:creationId xmlns:a16="http://schemas.microsoft.com/office/drawing/2014/main" id="{4EE60D38-F351-B84B-9574-BED85401F307}"/>
+                    </a:ext>
+                  </a:extLst>
+                </p:cNvPr>
+                <p:cNvSpPr txBox="1"/>
+                <p:nvPr/>
+              </p:nvSpPr>
+              <p:spPr>
+                <a:xfrm>
+                  <a:off x="2006211" y="4066495"/>
+                  <a:ext cx="1055915" cy="400110"/>
+                </a:xfrm>
+                <a:prstGeom prst="rect">
+                  <a:avLst/>
+                </a:prstGeom>
+                <a:noFill/>
+                <a:ln>
+                  <a:solidFill>
+                    <a:schemeClr val="tx1"/>
+                  </a:solidFill>
+                </a:ln>
+              </p:spPr>
+              <p:txBody>
+                <a:bodyPr wrap="square" rtlCol="0">
+                  <a:spAutoFit/>
+                </a:bodyPr>
+                <a:lstStyle/>
+                <a:p>
+                  <a:r>
+                    <a:rPr lang="en-US" sz="1000" dirty="0"/>
+                    <a:t>Add a comment…</a:t>
+                  </a:r>
+                </a:p>
+              </p:txBody>
+            </p:sp>
+            <p:sp>
+              <p:nvSpPr>
+                <p:cNvPr id="193" name="Rounded Rectangle 192">
+                  <a:extLst>
+                    <a:ext uri="{FF2B5EF4-FFF2-40B4-BE49-F238E27FC236}">
+                      <a16:creationId xmlns:a16="http://schemas.microsoft.com/office/drawing/2014/main" id="{02FA820C-7E2B-0346-A2DA-D2BACF62418C}"/>
+                    </a:ext>
+                  </a:extLst>
+                </p:cNvPr>
+                <p:cNvSpPr/>
+                <p:nvPr/>
+              </p:nvSpPr>
+              <p:spPr>
+                <a:xfrm>
+                  <a:off x="1391168" y="2430590"/>
+                  <a:ext cx="2286000" cy="2368296"/>
+                </a:xfrm>
+                <a:prstGeom prst="roundRect">
+                  <a:avLst/>
+                </a:prstGeom>
+                <a:noFill/>
+                <a:ln w="38100"/>
+              </p:spPr>
+              <p:style>
+                <a:lnRef idx="2">
+                  <a:schemeClr val="accent1">
+                    <a:shade val="50000"/>
+                  </a:schemeClr>
+                </a:lnRef>
+                <a:fillRef idx="1">
+                  <a:schemeClr val="accent1"/>
+                </a:fillRef>
+                <a:effectRef idx="0">
+                  <a:schemeClr val="accent1"/>
+                </a:effectRef>
+                <a:fontRef idx="minor">
+                  <a:schemeClr val="lt1"/>
+                </a:fontRef>
+              </p:style>
+              <p:txBody>
+                <a:bodyPr rtlCol="0" anchor="ctr"/>
+                <a:lstStyle/>
+                <a:p>
+                  <a:pPr algn="ctr"/>
+                  <a:endParaRPr lang="en-US"/>
+                </a:p>
+              </p:txBody>
+            </p:sp>
+            <p:sp>
+              <p:nvSpPr>
+                <p:cNvPr id="194" name="Rounded Rectangle 193">
+                  <a:extLst>
+                    <a:ext uri="{FF2B5EF4-FFF2-40B4-BE49-F238E27FC236}">
+                      <a16:creationId xmlns:a16="http://schemas.microsoft.com/office/drawing/2014/main" id="{0CC9D2BE-C3A6-A34D-BDA8-D4C55D547589}"/>
+                    </a:ext>
+                  </a:extLst>
+                </p:cNvPr>
+                <p:cNvSpPr/>
+                <p:nvPr/>
+              </p:nvSpPr>
+              <p:spPr>
+                <a:xfrm>
+                  <a:off x="1391168" y="2447864"/>
+                  <a:ext cx="2286000" cy="322767"/>
+                </a:xfrm>
+                <a:prstGeom prst="roundRect">
+                  <a:avLst>
+                    <a:gd name="adj" fmla="val 50000"/>
+                  </a:avLst>
+                </a:prstGeom>
+              </p:spPr>
+              <p:style>
+                <a:lnRef idx="2">
+                  <a:schemeClr val="accent1">
+                    <a:shade val="50000"/>
+                  </a:schemeClr>
+                </a:lnRef>
+                <a:fillRef idx="1">
+                  <a:schemeClr val="accent1"/>
+                </a:fillRef>
+                <a:effectRef idx="0">
+                  <a:schemeClr val="accent1"/>
+                </a:effectRef>
+                <a:fontRef idx="minor">
+                  <a:schemeClr val="lt1"/>
+                </a:fontRef>
+              </p:style>
+              <p:txBody>
+                <a:bodyPr rtlCol="0" anchor="ctr"/>
+                <a:lstStyle/>
+                <a:p>
+                  <a:pPr algn="ctr"/>
+                  <a:r>
+                    <a:rPr lang="en-US" dirty="0" err="1"/>
+                    <a:t>target.com</a:t>
+                  </a:r>
+                  <a:r>
+                    <a:rPr lang="en-US" dirty="0"/>
+                    <a:t>/pic/1234</a:t>
+                  </a:r>
+                </a:p>
+              </p:txBody>
+            </p:sp>
+          </p:grpSp>
+          <p:grpSp>
+            <p:nvGrpSpPr>
+              <p:cNvPr id="168" name="Group 167">
+                <a:extLst>
+                  <a:ext uri="{FF2B5EF4-FFF2-40B4-BE49-F238E27FC236}">
+                    <a16:creationId xmlns:a16="http://schemas.microsoft.com/office/drawing/2014/main" id="{10B18984-AF58-424B-B615-59052E385EB9}"/>
+                  </a:ext>
+                </a:extLst>
+              </p:cNvPr>
+              <p:cNvGrpSpPr/>
+              <p:nvPr/>
+            </p:nvGrpSpPr>
+            <p:grpSpPr>
+              <a:xfrm>
+                <a:off x="4822171" y="683927"/>
+                <a:ext cx="2286000" cy="2368296"/>
+                <a:chOff x="1391168" y="2430590"/>
+                <a:chExt cx="2286000" cy="2368296"/>
+              </a:xfrm>
+            </p:grpSpPr>
+            <p:grpSp>
+              <p:nvGrpSpPr>
+                <p:cNvPr id="182" name="Group 181">
+                  <a:extLst>
+                    <a:ext uri="{FF2B5EF4-FFF2-40B4-BE49-F238E27FC236}">
+                      <a16:creationId xmlns:a16="http://schemas.microsoft.com/office/drawing/2014/main" id="{D0C77D57-57A7-EB4A-82A7-E9B899D6B197}"/>
+                    </a:ext>
+                  </a:extLst>
+                </p:cNvPr>
+                <p:cNvGrpSpPr/>
+                <p:nvPr/>
+              </p:nvGrpSpPr>
+              <p:grpSpPr>
+                <a:xfrm>
+                  <a:off x="2006211" y="2847975"/>
+                  <a:ext cx="1055915" cy="903514"/>
+                  <a:chOff x="2006211" y="2847975"/>
+                  <a:chExt cx="1055915" cy="903514"/>
+                </a:xfrm>
+              </p:grpSpPr>
+              <p:sp>
+                <p:nvSpPr>
+                  <p:cNvPr id="187" name="Rounded Rectangle 186">
+                    <a:extLst>
+                      <a:ext uri="{FF2B5EF4-FFF2-40B4-BE49-F238E27FC236}">
+                        <a16:creationId xmlns:a16="http://schemas.microsoft.com/office/drawing/2014/main" id="{01164BF5-0816-914A-A65E-C75143F92FFA}"/>
+                      </a:ext>
+                    </a:extLst>
+                  </p:cNvPr>
+                  <p:cNvSpPr/>
+                  <p:nvPr/>
+                </p:nvSpPr>
+                <p:spPr>
+                  <a:xfrm>
+                    <a:off x="2006211" y="2847975"/>
+                    <a:ext cx="1055915" cy="903514"/>
+                  </a:xfrm>
+                  <a:prstGeom prst="roundRect">
+                    <a:avLst/>
+                  </a:prstGeom>
+                  <a:noFill/>
+                  <a:ln w="38100"/>
+                </p:spPr>
+                <p:style>
+                  <a:lnRef idx="2">
+                    <a:schemeClr val="accent1">
+                      <a:shade val="50000"/>
+                    </a:schemeClr>
+                  </a:lnRef>
+                  <a:fillRef idx="1">
+                    <a:schemeClr val="accent1"/>
+                  </a:fillRef>
+                  <a:effectRef idx="0">
+                    <a:schemeClr val="accent1"/>
+                  </a:effectRef>
+                  <a:fontRef idx="minor">
+                    <a:schemeClr val="lt1"/>
+                  </a:fontRef>
+                </p:style>
+                <p:txBody>
+                  <a:bodyPr rtlCol="0" anchor="ctr"/>
+                  <a:lstStyle/>
+                  <a:p>
+                    <a:pPr algn="ctr"/>
+                    <a:endParaRPr lang="en-US" dirty="0"/>
+                  </a:p>
+                </p:txBody>
+              </p:sp>
+              <p:sp>
+                <p:nvSpPr>
+                  <p:cNvPr id="188" name="Trapezoid 187">
+                    <a:extLst>
+                      <a:ext uri="{FF2B5EF4-FFF2-40B4-BE49-F238E27FC236}">
+                        <a16:creationId xmlns:a16="http://schemas.microsoft.com/office/drawing/2014/main" id="{B83AD14F-AFE6-4C4F-84C5-ACB81C3C302E}"/>
+                      </a:ext>
+                    </a:extLst>
+                  </p:cNvPr>
+                  <p:cNvSpPr/>
+                  <p:nvPr/>
+                </p:nvSpPr>
+                <p:spPr>
+                  <a:xfrm>
+                    <a:off x="2257425" y="3299732"/>
+                    <a:ext cx="528638" cy="315006"/>
+                  </a:xfrm>
+                  <a:prstGeom prst="trapezoid">
+                    <a:avLst/>
+                  </a:prstGeom>
+                  <a:ln>
+                    <a:noFill/>
+                  </a:ln>
+                </p:spPr>
+                <p:style>
+                  <a:lnRef idx="2">
+                    <a:schemeClr val="accent1">
+                      <a:shade val="50000"/>
+                    </a:schemeClr>
+                  </a:lnRef>
+                  <a:fillRef idx="1">
+                    <a:schemeClr val="accent1"/>
+                  </a:fillRef>
+                  <a:effectRef idx="0">
+                    <a:schemeClr val="accent1"/>
+                  </a:effectRef>
+                  <a:fontRef idx="minor">
+                    <a:schemeClr val="lt1"/>
+                  </a:fontRef>
+                </p:style>
+                <p:txBody>
+                  <a:bodyPr rtlCol="0" anchor="ctr"/>
+                  <a:lstStyle/>
+                  <a:p>
+                    <a:pPr algn="ctr"/>
+                    <a:endParaRPr lang="en-US"/>
+                  </a:p>
+                </p:txBody>
+              </p:sp>
+              <p:sp>
+                <p:nvSpPr>
+                  <p:cNvPr id="189" name="Teardrop 188">
+                    <a:extLst>
+                      <a:ext uri="{FF2B5EF4-FFF2-40B4-BE49-F238E27FC236}">
+                        <a16:creationId xmlns:a16="http://schemas.microsoft.com/office/drawing/2014/main" id="{151A5131-BF0A-3942-9B78-5B6D2E0CAFDA}"/>
+                      </a:ext>
+                    </a:extLst>
+                  </p:cNvPr>
+                  <p:cNvSpPr/>
+                  <p:nvPr/>
+                </p:nvSpPr>
+                <p:spPr>
+                  <a:xfrm>
+                    <a:off x="2370706" y="3005819"/>
+                    <a:ext cx="310924" cy="314324"/>
+                  </a:xfrm>
+                  <a:prstGeom prst="teardrop">
+                    <a:avLst>
+                      <a:gd name="adj" fmla="val 118708"/>
+                    </a:avLst>
+                  </a:prstGeom>
+                  <a:ln>
+                    <a:noFill/>
+                  </a:ln>
+                </p:spPr>
+                <p:style>
+                  <a:lnRef idx="2">
+                    <a:schemeClr val="accent1">
+                      <a:shade val="50000"/>
+                    </a:schemeClr>
+                  </a:lnRef>
+                  <a:fillRef idx="1">
+                    <a:schemeClr val="accent1"/>
+                  </a:fillRef>
+                  <a:effectRef idx="0">
+                    <a:schemeClr val="accent1"/>
+                  </a:effectRef>
+                  <a:fontRef idx="minor">
+                    <a:schemeClr val="lt1"/>
+                  </a:fontRef>
+                </p:style>
+                <p:txBody>
+                  <a:bodyPr rtlCol="0" anchor="ctr"/>
+                  <a:lstStyle/>
+                  <a:p>
+                    <a:pPr algn="ctr"/>
+                    <a:endParaRPr lang="en-US"/>
+                  </a:p>
+                </p:txBody>
+              </p:sp>
+            </p:grpSp>
+            <p:sp>
+              <p:nvSpPr>
+                <p:cNvPr id="183" name="TextBox 182">
+                  <a:extLst>
+                    <a:ext uri="{FF2B5EF4-FFF2-40B4-BE49-F238E27FC236}">
+                      <a16:creationId xmlns:a16="http://schemas.microsoft.com/office/drawing/2014/main" id="{64FAD60A-4A1A-EF47-AF69-0829875024FC}"/>
+                    </a:ext>
+                  </a:extLst>
+                </p:cNvPr>
+                <p:cNvSpPr txBox="1"/>
+                <p:nvPr/>
+              </p:nvSpPr>
+              <p:spPr>
+                <a:xfrm>
+                  <a:off x="1904513" y="3804885"/>
+                  <a:ext cx="1157613" cy="261610"/>
+                </a:xfrm>
+                <a:prstGeom prst="rect">
+                  <a:avLst/>
+                </a:prstGeom>
+                <a:noFill/>
+              </p:spPr>
+              <p:txBody>
+                <a:bodyPr wrap="square" rtlCol="0">
+                  <a:spAutoFit/>
+                </a:bodyPr>
+                <a:lstStyle/>
+                <a:p>
+                  <a:r>
+                    <a:rPr lang="en-US" sz="1100" dirty="0"/>
+                    <a:t>Eve: Great hair!</a:t>
+                  </a:r>
+                </a:p>
+              </p:txBody>
+            </p:sp>
+            <p:sp>
+              <p:nvSpPr>
+                <p:cNvPr id="184" name="TextBox 183">
+                  <a:extLst>
+                    <a:ext uri="{FF2B5EF4-FFF2-40B4-BE49-F238E27FC236}">
+                      <a16:creationId xmlns:a16="http://schemas.microsoft.com/office/drawing/2014/main" id="{8B8D5107-73A6-9A4B-B9F1-EB61CCE8E3E6}"/>
+                    </a:ext>
+                  </a:extLst>
+                </p:cNvPr>
+                <p:cNvSpPr txBox="1"/>
+                <p:nvPr/>
+              </p:nvSpPr>
+              <p:spPr>
+                <a:xfrm>
+                  <a:off x="2006211" y="4066495"/>
+                  <a:ext cx="1055915" cy="400110"/>
+                </a:xfrm>
+                <a:prstGeom prst="rect">
+                  <a:avLst/>
+                </a:prstGeom>
+                <a:noFill/>
+                <a:ln>
+                  <a:solidFill>
+                    <a:schemeClr val="tx1"/>
+                  </a:solidFill>
+                </a:ln>
+              </p:spPr>
+              <p:txBody>
+                <a:bodyPr wrap="square" rtlCol="0">
+                  <a:spAutoFit/>
+                </a:bodyPr>
+                <a:lstStyle/>
+                <a:p>
+                  <a:r>
+                    <a:rPr lang="en-US" sz="1000" dirty="0"/>
+                    <a:t>&lt;script&gt;alert(“XSS”)&lt;/script&gt;</a:t>
+                  </a:r>
+                </a:p>
+              </p:txBody>
+            </p:sp>
+            <p:sp>
+              <p:nvSpPr>
+                <p:cNvPr id="185" name="Rounded Rectangle 184">
+                  <a:extLst>
+                    <a:ext uri="{FF2B5EF4-FFF2-40B4-BE49-F238E27FC236}">
+                      <a16:creationId xmlns:a16="http://schemas.microsoft.com/office/drawing/2014/main" id="{8595912C-4EA9-3A42-8F0C-200198D4D2BD}"/>
+                    </a:ext>
+                  </a:extLst>
+                </p:cNvPr>
+                <p:cNvSpPr/>
+                <p:nvPr/>
+              </p:nvSpPr>
+              <p:spPr>
+                <a:xfrm>
+                  <a:off x="1391168" y="2430590"/>
+                  <a:ext cx="2286000" cy="2368296"/>
+                </a:xfrm>
+                <a:prstGeom prst="roundRect">
+                  <a:avLst/>
+                </a:prstGeom>
+                <a:noFill/>
+                <a:ln w="38100"/>
+              </p:spPr>
+              <p:style>
+                <a:lnRef idx="2">
+                  <a:schemeClr val="accent1">
+                    <a:shade val="50000"/>
+                  </a:schemeClr>
+                </a:lnRef>
+                <a:fillRef idx="1">
+                  <a:schemeClr val="accent1"/>
+                </a:fillRef>
+                <a:effectRef idx="0">
+                  <a:schemeClr val="accent1"/>
+                </a:effectRef>
+                <a:fontRef idx="minor">
+                  <a:schemeClr val="lt1"/>
+                </a:fontRef>
+              </p:style>
+              <p:txBody>
+                <a:bodyPr rtlCol="0" anchor="ctr"/>
+                <a:lstStyle/>
+                <a:p>
+                  <a:pPr algn="ctr"/>
+                  <a:endParaRPr lang="en-US"/>
+                </a:p>
+              </p:txBody>
+            </p:sp>
+            <p:sp>
+              <p:nvSpPr>
+                <p:cNvPr id="186" name="Rounded Rectangle 185">
+                  <a:extLst>
+                    <a:ext uri="{FF2B5EF4-FFF2-40B4-BE49-F238E27FC236}">
+                      <a16:creationId xmlns:a16="http://schemas.microsoft.com/office/drawing/2014/main" id="{48E9F535-0B43-E849-A2C8-4409042F39F9}"/>
+                    </a:ext>
+                  </a:extLst>
+                </p:cNvPr>
+                <p:cNvSpPr/>
+                <p:nvPr/>
+              </p:nvSpPr>
+              <p:spPr>
+                <a:xfrm>
+                  <a:off x="1391168" y="2447864"/>
+                  <a:ext cx="2286000" cy="322767"/>
+                </a:xfrm>
+                <a:prstGeom prst="roundRect">
+                  <a:avLst>
+                    <a:gd name="adj" fmla="val 50000"/>
+                  </a:avLst>
+                </a:prstGeom>
+              </p:spPr>
+              <p:style>
+                <a:lnRef idx="2">
+                  <a:schemeClr val="accent1">
+                    <a:shade val="50000"/>
+                  </a:schemeClr>
+                </a:lnRef>
+                <a:fillRef idx="1">
+                  <a:schemeClr val="accent1"/>
+                </a:fillRef>
+                <a:effectRef idx="0">
+                  <a:schemeClr val="accent1"/>
+                </a:effectRef>
+                <a:fontRef idx="minor">
+                  <a:schemeClr val="lt1"/>
+                </a:fontRef>
+              </p:style>
+              <p:txBody>
+                <a:bodyPr rtlCol="0" anchor="ctr"/>
+                <a:lstStyle/>
+                <a:p>
+                  <a:pPr algn="ctr"/>
+                  <a:r>
+                    <a:rPr lang="en-US" dirty="0" err="1"/>
+                    <a:t>target.com</a:t>
+                  </a:r>
+                  <a:r>
+                    <a:rPr lang="en-US" dirty="0"/>
+                    <a:t>/pic/1234</a:t>
+                  </a:r>
+                </a:p>
+              </p:txBody>
+            </p:sp>
+          </p:grpSp>
+          <p:cxnSp>
+            <p:nvCxnSpPr>
+              <p:cNvPr id="169" name="Straight Arrow Connector 168">
+                <a:extLst>
+                  <a:ext uri="{FF2B5EF4-FFF2-40B4-BE49-F238E27FC236}">
+                    <a16:creationId xmlns:a16="http://schemas.microsoft.com/office/drawing/2014/main" id="{4D5627A1-5897-1A45-AF51-C049F2F8C91A}"/>
+                  </a:ext>
+                </a:extLst>
+              </p:cNvPr>
+              <p:cNvCxnSpPr>
+                <a:stCxn id="187" idx="3"/>
+                <a:endCxn id="194" idx="1"/>
+              </p:cNvCxnSpPr>
+              <p:nvPr/>
+            </p:nvCxnSpPr>
+            <p:spPr>
+              <a:xfrm>
+                <a:off x="2067044" y="2502613"/>
+                <a:ext cx="3370170" cy="17274"/>
+              </a:xfrm>
+              <a:prstGeom prst="straightConnector1">
+                <a:avLst/>
+              </a:prstGeom>
+              <a:ln w="50800">
+                <a:tailEnd type="triangle"/>
+              </a:ln>
+            </p:spPr>
+            <p:style>
+              <a:lnRef idx="1">
+                <a:schemeClr val="accent1"/>
+              </a:lnRef>
+              <a:fillRef idx="0">
+                <a:schemeClr val="accent1"/>
+              </a:fillRef>
+              <a:effectRef idx="0">
+                <a:schemeClr val="accent1"/>
+              </a:effectRef>
+              <a:fontRef idx="minor">
+                <a:schemeClr val="tx1"/>
+              </a:fontRef>
+            </p:style>
+          </p:cxnSp>
+          <p:sp>
+            <p:nvSpPr>
+              <p:cNvPr id="170" name="TextBox 169">
+                <a:extLst>
+                  <a:ext uri="{FF2B5EF4-FFF2-40B4-BE49-F238E27FC236}">
+                    <a16:creationId xmlns:a16="http://schemas.microsoft.com/office/drawing/2014/main" id="{E59004DC-4459-444D-822C-FB2688E12D55}"/>
+                  </a:ext>
+                </a:extLst>
+              </p:cNvPr>
+              <p:cNvSpPr txBox="1"/>
+              <p:nvPr/>
+            </p:nvSpPr>
+            <p:spPr>
+              <a:xfrm>
+                <a:off x="2790179" y="222856"/>
+                <a:ext cx="2093688" cy="1138773"/>
+              </a:xfrm>
+              <a:prstGeom prst="rect">
+                <a:avLst/>
+              </a:prstGeom>
+              <a:noFill/>
+            </p:spPr>
+            <p:txBody>
+              <a:bodyPr wrap="square" rtlCol="0">
+                <a:spAutoFit/>
+              </a:bodyPr>
+              <a:lstStyle/>
+              <a:p>
+                <a:r>
+                  <a:rPr lang="en-US" sz="2800" dirty="0"/>
+                  <a:t>Tool input</a:t>
+                </a:r>
+              </a:p>
+              <a:p>
+                <a:r>
+                  <a:rPr lang="en-US" sz="2000" dirty="0"/>
+                  <a:t>(Fuzzed malicious input)</a:t>
+                </a:r>
+                <a:endParaRPr lang="en-US" sz="2400" dirty="0"/>
+              </a:p>
+            </p:txBody>
+          </p:sp>
+          <p:sp>
+            <p:nvSpPr>
+              <p:cNvPr id="171" name="TextBox 170">
+                <a:extLst>
+                  <a:ext uri="{FF2B5EF4-FFF2-40B4-BE49-F238E27FC236}">
+                    <a16:creationId xmlns:a16="http://schemas.microsoft.com/office/drawing/2014/main" id="{6508FFC0-BA12-874D-B76B-685A1802CB66}"/>
+                  </a:ext>
+                </a:extLst>
+              </p:cNvPr>
+              <p:cNvSpPr txBox="1"/>
+              <p:nvPr/>
+            </p:nvSpPr>
+            <p:spPr>
+              <a:xfrm>
+                <a:off x="2962279" y="1395559"/>
+                <a:ext cx="1771455" cy="1015663"/>
+              </a:xfrm>
+              <a:prstGeom prst="rect">
+                <a:avLst/>
+              </a:prstGeom>
+              <a:noFill/>
+              <a:ln>
+                <a:noFill/>
+              </a:ln>
+            </p:spPr>
+            <p:txBody>
+              <a:bodyPr wrap="square" rtlCol="0">
+                <a:spAutoFit/>
+              </a:bodyPr>
+              <a:lstStyle/>
+              <a:p>
+                <a:r>
+                  <a:rPr lang="en-US" sz="2000" dirty="0"/>
+                  <a:t>&lt;</a:t>
+                </a:r>
+                <a:r>
+                  <a:rPr lang="en-US" sz="2000" dirty="0" err="1"/>
+                  <a:t>ScRiPt</a:t>
+                </a:r>
+                <a:r>
+                  <a:rPr lang="en-US" sz="2000" dirty="0"/>
+                  <a:t>&gt;</a:t>
+                </a:r>
+              </a:p>
+              <a:p>
+                <a:r>
+                  <a:rPr lang="en-US" sz="2000" dirty="0"/>
+                  <a:t>alert(“XSS”)</a:t>
+                </a:r>
+              </a:p>
+              <a:p>
+                <a:r>
+                  <a:rPr lang="en-US" sz="2000" dirty="0"/>
+                  <a:t>&lt;/</a:t>
+                </a:r>
+                <a:r>
+                  <a:rPr lang="en-US" sz="2000" dirty="0" err="1"/>
+                  <a:t>ScRiPt</a:t>
+                </a:r>
+                <a:r>
+                  <a:rPr lang="en-US" sz="2000" dirty="0"/>
+                  <a:t>&gt;</a:t>
+                </a:r>
+              </a:p>
+            </p:txBody>
+          </p:sp>
+          <p:grpSp>
+            <p:nvGrpSpPr>
+              <p:cNvPr id="172" name="Group 171">
+                <a:extLst>
+                  <a:ext uri="{FF2B5EF4-FFF2-40B4-BE49-F238E27FC236}">
+                    <a16:creationId xmlns:a16="http://schemas.microsoft.com/office/drawing/2014/main" id="{5B5F091E-4A8D-6249-BB03-86D686E743E4}"/>
+                  </a:ext>
+                </a:extLst>
+              </p:cNvPr>
+              <p:cNvGrpSpPr/>
+              <p:nvPr/>
+            </p:nvGrpSpPr>
+            <p:grpSpPr>
+              <a:xfrm>
+                <a:off x="8926003" y="666653"/>
+                <a:ext cx="2286000" cy="2368296"/>
+                <a:chOff x="1391168" y="2430590"/>
+                <a:chExt cx="2286000" cy="2368296"/>
+              </a:xfrm>
+            </p:grpSpPr>
+            <p:grpSp>
+              <p:nvGrpSpPr>
+                <p:cNvPr id="175" name="Group 174">
+                  <a:extLst>
+                    <a:ext uri="{FF2B5EF4-FFF2-40B4-BE49-F238E27FC236}">
+                      <a16:creationId xmlns:a16="http://schemas.microsoft.com/office/drawing/2014/main" id="{3B1F1717-444A-B644-B565-1AA8DE304203}"/>
+                    </a:ext>
+                  </a:extLst>
+                </p:cNvPr>
+                <p:cNvGrpSpPr/>
+                <p:nvPr/>
+              </p:nvGrpSpPr>
+              <p:grpSpPr>
+                <a:xfrm>
+                  <a:off x="2006211" y="2847975"/>
+                  <a:ext cx="1055915" cy="903514"/>
+                  <a:chOff x="2006211" y="2847975"/>
+                  <a:chExt cx="1055915" cy="903514"/>
+                </a:xfrm>
+              </p:grpSpPr>
+              <p:sp>
+                <p:nvSpPr>
+                  <p:cNvPr id="179" name="Rounded Rectangle 178">
+                    <a:extLst>
+                      <a:ext uri="{FF2B5EF4-FFF2-40B4-BE49-F238E27FC236}">
+                        <a16:creationId xmlns:a16="http://schemas.microsoft.com/office/drawing/2014/main" id="{FF69E189-32AD-5444-BD0D-2E0157C0FF4C}"/>
+                      </a:ext>
+                    </a:extLst>
+                  </p:cNvPr>
+                  <p:cNvSpPr/>
+                  <p:nvPr/>
+                </p:nvSpPr>
+                <p:spPr>
+                  <a:xfrm>
+                    <a:off x="2006211" y="2847975"/>
+                    <a:ext cx="1055915" cy="903514"/>
+                  </a:xfrm>
+                  <a:prstGeom prst="roundRect">
+                    <a:avLst/>
+                  </a:prstGeom>
+                  <a:noFill/>
+                  <a:ln w="38100"/>
+                </p:spPr>
+                <p:style>
+                  <a:lnRef idx="2">
+                    <a:schemeClr val="accent1">
+                      <a:shade val="50000"/>
+                    </a:schemeClr>
+                  </a:lnRef>
+                  <a:fillRef idx="1">
+                    <a:schemeClr val="accent1"/>
+                  </a:fillRef>
+                  <a:effectRef idx="0">
+                    <a:schemeClr val="accent1"/>
+                  </a:effectRef>
+                  <a:fontRef idx="minor">
+                    <a:schemeClr val="lt1"/>
+                  </a:fontRef>
+                </p:style>
+                <p:txBody>
+                  <a:bodyPr rtlCol="0" anchor="ctr"/>
+                  <a:lstStyle/>
+                  <a:p>
+                    <a:pPr algn="ctr"/>
+                    <a:endParaRPr lang="en-US" dirty="0"/>
+                  </a:p>
+                </p:txBody>
+              </p:sp>
+              <p:sp>
+                <p:nvSpPr>
+                  <p:cNvPr id="180" name="Trapezoid 179">
+                    <a:extLst>
+                      <a:ext uri="{FF2B5EF4-FFF2-40B4-BE49-F238E27FC236}">
+                        <a16:creationId xmlns:a16="http://schemas.microsoft.com/office/drawing/2014/main" id="{0468EDE4-2BC0-0647-92E8-87DB0C1FC5CA}"/>
+                      </a:ext>
+                    </a:extLst>
+                  </p:cNvPr>
+                  <p:cNvSpPr/>
+                  <p:nvPr/>
+                </p:nvSpPr>
+                <p:spPr>
+                  <a:xfrm>
+                    <a:off x="2257425" y="3299732"/>
+                    <a:ext cx="528638" cy="315006"/>
+                  </a:xfrm>
+                  <a:prstGeom prst="trapezoid">
+                    <a:avLst/>
+                  </a:prstGeom>
+                  <a:ln>
+                    <a:noFill/>
+                  </a:ln>
+                </p:spPr>
+                <p:style>
+                  <a:lnRef idx="2">
+                    <a:schemeClr val="accent1">
+                      <a:shade val="50000"/>
+                    </a:schemeClr>
+                  </a:lnRef>
+                  <a:fillRef idx="1">
+                    <a:schemeClr val="accent1"/>
+                  </a:fillRef>
+                  <a:effectRef idx="0">
+                    <a:schemeClr val="accent1"/>
+                  </a:effectRef>
+                  <a:fontRef idx="minor">
+                    <a:schemeClr val="lt1"/>
+                  </a:fontRef>
+                </p:style>
+                <p:txBody>
+                  <a:bodyPr rtlCol="0" anchor="ctr"/>
+                  <a:lstStyle/>
+                  <a:p>
+                    <a:pPr algn="ctr"/>
+                    <a:endParaRPr lang="en-US"/>
+                  </a:p>
+                </p:txBody>
+              </p:sp>
+              <p:sp>
+                <p:nvSpPr>
+                  <p:cNvPr id="181" name="Teardrop 180">
+                    <a:extLst>
+                      <a:ext uri="{FF2B5EF4-FFF2-40B4-BE49-F238E27FC236}">
+                        <a16:creationId xmlns:a16="http://schemas.microsoft.com/office/drawing/2014/main" id="{20E2EBB3-9FEA-D64C-BE98-C5B9E36169CB}"/>
+                      </a:ext>
+                    </a:extLst>
+                  </p:cNvPr>
+                  <p:cNvSpPr/>
+                  <p:nvPr/>
+                </p:nvSpPr>
+                <p:spPr>
+                  <a:xfrm>
+                    <a:off x="2370706" y="3005819"/>
+                    <a:ext cx="310924" cy="314324"/>
+                  </a:xfrm>
+                  <a:prstGeom prst="teardrop">
+                    <a:avLst>
+                      <a:gd name="adj" fmla="val 118708"/>
+                    </a:avLst>
+                  </a:prstGeom>
+                  <a:ln>
+                    <a:noFill/>
+                  </a:ln>
+                </p:spPr>
+                <p:style>
+                  <a:lnRef idx="2">
+                    <a:schemeClr val="accent1">
+                      <a:shade val="50000"/>
+                    </a:schemeClr>
+                  </a:lnRef>
+                  <a:fillRef idx="1">
+                    <a:schemeClr val="accent1"/>
+                  </a:fillRef>
+                  <a:effectRef idx="0">
+                    <a:schemeClr val="accent1"/>
+                  </a:effectRef>
+                  <a:fontRef idx="minor">
+                    <a:schemeClr val="lt1"/>
+                  </a:fontRef>
+                </p:style>
+                <p:txBody>
+                  <a:bodyPr rtlCol="0" anchor="ctr"/>
+                  <a:lstStyle/>
+                  <a:p>
+                    <a:pPr algn="ctr"/>
+                    <a:endParaRPr lang="en-US"/>
+                  </a:p>
+                </p:txBody>
+              </p:sp>
+            </p:grpSp>
+            <p:sp>
+              <p:nvSpPr>
+                <p:cNvPr id="176" name="TextBox 175">
+                  <a:extLst>
+                    <a:ext uri="{FF2B5EF4-FFF2-40B4-BE49-F238E27FC236}">
+                      <a16:creationId xmlns:a16="http://schemas.microsoft.com/office/drawing/2014/main" id="{8BC29A23-8D56-4548-A471-1B50C87333EA}"/>
+                    </a:ext>
+                  </a:extLst>
+                </p:cNvPr>
+                <p:cNvSpPr txBox="1"/>
+                <p:nvPr/>
+              </p:nvSpPr>
+              <p:spPr>
+                <a:xfrm>
+                  <a:off x="1904513" y="3804885"/>
+                  <a:ext cx="1157613" cy="261610"/>
+                </a:xfrm>
+                <a:prstGeom prst="rect">
+                  <a:avLst/>
+                </a:prstGeom>
+                <a:noFill/>
+              </p:spPr>
+              <p:txBody>
+                <a:bodyPr wrap="square" rtlCol="0">
+                  <a:spAutoFit/>
+                </a:bodyPr>
+                <a:lstStyle/>
+                <a:p>
+                  <a:r>
+                    <a:rPr lang="en-US" sz="1100" dirty="0"/>
+                    <a:t>Eve: Great hair!</a:t>
+                  </a:r>
+                </a:p>
+              </p:txBody>
+            </p:sp>
+            <p:sp>
+              <p:nvSpPr>
+                <p:cNvPr id="177" name="Rounded Rectangle 176">
+                  <a:extLst>
+                    <a:ext uri="{FF2B5EF4-FFF2-40B4-BE49-F238E27FC236}">
+                      <a16:creationId xmlns:a16="http://schemas.microsoft.com/office/drawing/2014/main" id="{8C0FA81D-5988-F84E-8FCD-A69DFF462F9E}"/>
+                    </a:ext>
+                  </a:extLst>
+                </p:cNvPr>
+                <p:cNvSpPr/>
+                <p:nvPr/>
+              </p:nvSpPr>
+              <p:spPr>
+                <a:xfrm>
+                  <a:off x="1391168" y="2430590"/>
+                  <a:ext cx="2286000" cy="2368296"/>
+                </a:xfrm>
+                <a:prstGeom prst="roundRect">
+                  <a:avLst/>
+                </a:prstGeom>
+                <a:noFill/>
+                <a:ln w="38100"/>
+              </p:spPr>
+              <p:style>
+                <a:lnRef idx="2">
+                  <a:schemeClr val="accent1">
+                    <a:shade val="50000"/>
+                  </a:schemeClr>
+                </a:lnRef>
+                <a:fillRef idx="1">
+                  <a:schemeClr val="accent1"/>
+                </a:fillRef>
+                <a:effectRef idx="0">
+                  <a:schemeClr val="accent1"/>
+                </a:effectRef>
+                <a:fontRef idx="minor">
+                  <a:schemeClr val="lt1"/>
+                </a:fontRef>
+              </p:style>
+              <p:txBody>
+                <a:bodyPr rtlCol="0" anchor="ctr"/>
+                <a:lstStyle/>
+                <a:p>
+                  <a:pPr algn="ctr"/>
+                  <a:endParaRPr lang="en-US"/>
+                </a:p>
+              </p:txBody>
+            </p:sp>
+            <p:sp>
+              <p:nvSpPr>
+                <p:cNvPr id="178" name="Rounded Rectangle 177">
+                  <a:extLst>
+                    <a:ext uri="{FF2B5EF4-FFF2-40B4-BE49-F238E27FC236}">
+                      <a16:creationId xmlns:a16="http://schemas.microsoft.com/office/drawing/2014/main" id="{03799208-EBEA-6A4D-844C-D4D189171737}"/>
+                    </a:ext>
+                  </a:extLst>
+                </p:cNvPr>
+                <p:cNvSpPr/>
+                <p:nvPr/>
+              </p:nvSpPr>
+              <p:spPr>
+                <a:xfrm>
+                  <a:off x="1391168" y="2447864"/>
+                  <a:ext cx="2286000" cy="322767"/>
+                </a:xfrm>
+                <a:prstGeom prst="roundRect">
+                  <a:avLst>
+                    <a:gd name="adj" fmla="val 50000"/>
+                  </a:avLst>
+                </a:prstGeom>
+              </p:spPr>
+              <p:style>
+                <a:lnRef idx="2">
+                  <a:schemeClr val="accent1">
+                    <a:shade val="50000"/>
+                  </a:schemeClr>
+                </a:lnRef>
+                <a:fillRef idx="1">
+                  <a:schemeClr val="accent1"/>
+                </a:fillRef>
+                <a:effectRef idx="0">
+                  <a:schemeClr val="accent1"/>
+                </a:effectRef>
+                <a:fontRef idx="minor">
+                  <a:schemeClr val="lt1"/>
+                </a:fontRef>
+              </p:style>
+              <p:txBody>
+                <a:bodyPr rtlCol="0" anchor="ctr"/>
+                <a:lstStyle/>
+                <a:p>
+                  <a:pPr algn="ctr"/>
+                  <a:r>
+                    <a:rPr lang="en-US" dirty="0" err="1"/>
+                    <a:t>target.com</a:t>
+                  </a:r>
+                  <a:r>
+                    <a:rPr lang="en-US" dirty="0"/>
+                    <a:t>/pic/1234</a:t>
+                  </a:r>
+                </a:p>
+              </p:txBody>
+            </p:sp>
+          </p:grpSp>
+          <p:sp>
+            <p:nvSpPr>
+              <p:cNvPr id="174" name="Right Arrow 173">
+                <a:extLst>
+                  <a:ext uri="{FF2B5EF4-FFF2-40B4-BE49-F238E27FC236}">
+                    <a16:creationId xmlns:a16="http://schemas.microsoft.com/office/drawing/2014/main" id="{6BA46A8B-4AC9-7C4A-949E-23DBFFF52A63}"/>
+                  </a:ext>
+                </a:extLst>
+              </p:cNvPr>
+              <p:cNvSpPr/>
+              <p:nvPr/>
+            </p:nvSpPr>
+            <p:spPr>
+              <a:xfrm>
+                <a:off x="7108171" y="1808108"/>
+                <a:ext cx="1817832" cy="291915"/>
+              </a:xfrm>
+              <a:prstGeom prst="rightArrow">
+                <a:avLst/>
+              </a:prstGeom>
+              <a:ln w="50800" cap="rnd">
+                <a:noFill/>
+              </a:ln>
+            </p:spPr>
+            <p:style>
+              <a:lnRef idx="2">
+                <a:schemeClr val="accent1">
+                  <a:shade val="50000"/>
+                </a:schemeClr>
+              </a:lnRef>
+              <a:fillRef idx="1">
+                <a:schemeClr val="accent1"/>
+              </a:fillRef>
+              <a:effectRef idx="0">
+                <a:schemeClr val="accent1"/>
+              </a:effectRef>
+              <a:fontRef idx="minor">
+                <a:schemeClr val="lt1"/>
+              </a:fontRef>
+            </p:style>
+            <p:txBody>
+              <a:bodyPr rtlCol="0" anchor="ctr"/>
+              <a:lstStyle/>
+              <a:p>
+                <a:pPr algn="ctr"/>
+                <a:endParaRPr lang="en-US"/>
+              </a:p>
+            </p:txBody>
+          </p:sp>
+        </p:grpSp>
+        <p:sp>
+          <p:nvSpPr>
+            <p:cNvPr id="198" name="TextBox 197">
+              <a:extLst>
+                <a:ext uri="{FF2B5EF4-FFF2-40B4-BE49-F238E27FC236}">
+                  <a16:creationId xmlns:a16="http://schemas.microsoft.com/office/drawing/2014/main" id="{08916003-6968-3940-97A2-A46F92E6399A}"/>
+                </a:ext>
+              </a:extLst>
+            </p:cNvPr>
+            <p:cNvSpPr txBox="1"/>
+            <p:nvPr/>
+          </p:nvSpPr>
+          <p:spPr>
+            <a:xfrm>
+              <a:off x="9439485" y="5502476"/>
+              <a:ext cx="1055915" cy="400110"/>
+            </a:xfrm>
+            <a:prstGeom prst="rect">
+              <a:avLst/>
+            </a:prstGeom>
+            <a:noFill/>
+            <a:ln>
+              <a:solidFill>
+                <a:schemeClr val="tx1"/>
+              </a:solidFill>
+            </a:ln>
+          </p:spPr>
+          <p:txBody>
+            <a:bodyPr wrap="square" rtlCol="0">
+              <a:spAutoFit/>
+            </a:bodyPr>
+            <a:lstStyle/>
+            <a:p>
+              <a:r>
+                <a:rPr lang="en-US" sz="1000" dirty="0"/>
+                <a:t>Add a comment…</a:t>
+              </a:r>
+            </a:p>
+          </p:txBody>
+        </p:sp>
+        <p:sp>
+          <p:nvSpPr>
+            <p:cNvPr id="199" name="Rounded Rectangle 198">
+              <a:extLst>
+                <a:ext uri="{FF2B5EF4-FFF2-40B4-BE49-F238E27FC236}">
+                  <a16:creationId xmlns:a16="http://schemas.microsoft.com/office/drawing/2014/main" id="{3E98A9B3-F499-4046-AF9D-84A6BBF736B9}"/>
+                </a:ext>
+              </a:extLst>
+            </p:cNvPr>
+            <p:cNvSpPr/>
+            <p:nvPr/>
+          </p:nvSpPr>
+          <p:spPr>
+            <a:xfrm>
+              <a:off x="9087719" y="4546513"/>
+              <a:ext cx="1784296" cy="1043402"/>
+            </a:xfrm>
+            <a:prstGeom prst="roundRect">
+              <a:avLst/>
+            </a:prstGeom>
+            <a:solidFill>
+              <a:schemeClr val="bg2">
+                <a:lumMod val="75000"/>
+              </a:schemeClr>
+            </a:solidFill>
+            <a:ln>
+              <a:noFill/>
+            </a:ln>
+          </p:spPr>
+          <p:style>
+            <a:lnRef idx="2">
+              <a:schemeClr val="accent1">
+                <a:shade val="50000"/>
+              </a:schemeClr>
+            </a:lnRef>
+            <a:fillRef idx="1">
+              <a:schemeClr val="accent1"/>
+            </a:fillRef>
+            <a:effectRef idx="0">
+              <a:schemeClr val="accent1"/>
+            </a:effectRef>
+            <a:fontRef idx="minor">
+              <a:schemeClr val="lt1"/>
+            </a:fontRef>
+          </p:style>
+          <p:txBody>
+            <a:bodyPr rtlCol="0" anchor="ctr"/>
+            <a:lstStyle/>
+            <a:p>
+              <a:pPr algn="ctr"/>
+              <a:r>
+                <a:rPr lang="en-US" sz="2800" b="1" dirty="0"/>
+                <a:t>XSS</a:t>
+              </a:r>
+              <a:endParaRPr lang="en-US" b="1" dirty="0"/>
+            </a:p>
+          </p:txBody>
+        </p:sp>
+        <p:cxnSp>
+          <p:nvCxnSpPr>
+            <p:cNvPr id="201" name="Elbow Connector 200">
+              <a:extLst>
+                <a:ext uri="{FF2B5EF4-FFF2-40B4-BE49-F238E27FC236}">
+                  <a16:creationId xmlns:a16="http://schemas.microsoft.com/office/drawing/2014/main" id="{322296AC-305E-E648-8863-FA26722B33FA}"/>
+                </a:ext>
+              </a:extLst>
+            </p:cNvPr>
+            <p:cNvCxnSpPr>
+              <a:cxnSpLocks/>
+              <a:stCxn id="53" idx="2"/>
+              <a:endCxn id="193" idx="0"/>
+            </p:cNvCxnSpPr>
+            <p:nvPr/>
+          </p:nvCxnSpPr>
+          <p:spPr>
+            <a:xfrm rot="5400000">
+              <a:off x="4839602" y="-1330078"/>
+              <a:ext cx="1750615" cy="8529917"/>
+            </a:xfrm>
+            <a:prstGeom prst="bentConnector3">
+              <a:avLst/>
+            </a:prstGeom>
+            <a:ln w="88900">
+              <a:solidFill>
+                <a:srgbClr val="00B050"/>
+              </a:solidFill>
+              <a:prstDash val="dash"/>
+              <a:tailEnd type="triangle"/>
+            </a:ln>
+          </p:spPr>
+          <p:style>
+            <a:lnRef idx="1">
+              <a:schemeClr val="accent1"/>
+            </a:lnRef>
+            <a:fillRef idx="0">
+              <a:schemeClr val="accent1"/>
+            </a:fillRef>
+            <a:effectRef idx="0">
+              <a:schemeClr val="accent1"/>
+            </a:effectRef>
+            <a:fontRef idx="minor">
+              <a:schemeClr val="tx1"/>
+            </a:fontRef>
+          </p:style>
+        </p:cxnSp>
+      </p:grpSp>
+      <p:sp>
+        <p:nvSpPr>
+          <p:cNvPr id="204" name="TextBox 203">
+            <a:extLst>
+              <a:ext uri="{FF2B5EF4-FFF2-40B4-BE49-F238E27FC236}">
+                <a16:creationId xmlns:a16="http://schemas.microsoft.com/office/drawing/2014/main" id="{E18E1372-681B-2847-810C-2BE6F89C64DD}"/>
+              </a:ext>
+            </a:extLst>
+          </p:cNvPr>
+          <p:cNvSpPr txBox="1"/>
+          <p:nvPr/>
+        </p:nvSpPr>
+        <p:spPr>
+          <a:xfrm>
+            <a:off x="2935896" y="3302055"/>
+            <a:ext cx="6829981" cy="523220"/>
+          </a:xfrm>
+          <a:prstGeom prst="rect">
+            <a:avLst/>
+          </a:prstGeom>
+          <a:noFill/>
+        </p:spPr>
+        <p:txBody>
+          <a:bodyPr wrap="square" rtlCol="0">
+            <a:spAutoFit/>
+          </a:bodyPr>
+          <a:lstStyle/>
+          <a:p>
+            <a:r>
+              <a:rPr lang="en-US" sz="2800" dirty="0"/>
+              <a:t>Automated Action Replay</a:t>
+            </a:r>
+          </a:p>
+        </p:txBody>
+      </p:sp>
+      <p:sp>
+        <p:nvSpPr>
+          <p:cNvPr id="209" name="Rounded Rectangle 208">
+            <a:extLst>
+              <a:ext uri="{FF2B5EF4-FFF2-40B4-BE49-F238E27FC236}">
+                <a16:creationId xmlns:a16="http://schemas.microsoft.com/office/drawing/2014/main" id="{5700BFAE-0256-E941-B2A4-F614CE666339}"/>
+              </a:ext>
+            </a:extLst>
+          </p:cNvPr>
+          <p:cNvSpPr/>
+          <p:nvPr/>
+        </p:nvSpPr>
+        <p:spPr>
+          <a:xfrm>
+            <a:off x="10190082" y="6171034"/>
+            <a:ext cx="606255" cy="258918"/>
+          </a:xfrm>
+          <a:prstGeom prst="roundRect">
+            <a:avLst/>
+          </a:prstGeom>
+          <a:solidFill>
+            <a:schemeClr val="tx2"/>
+          </a:solidFill>
+        </p:spPr>
+        <p:style>
+          <a:lnRef idx="2">
+            <a:schemeClr val="accent1">
+              <a:shade val="50000"/>
+            </a:schemeClr>
+          </a:lnRef>
+          <a:fillRef idx="1">
+            <a:schemeClr val="accent1"/>
+          </a:fillRef>
+          <a:effectRef idx="0">
+            <a:schemeClr val="accent1"/>
+          </a:effectRef>
+          <a:fontRef idx="minor">
+            <a:schemeClr val="lt1"/>
+          </a:fontRef>
+        </p:style>
+        <p:txBody>
+          <a:bodyPr rtlCol="0" anchor="ctr"/>
+          <a:lstStyle/>
+          <a:p>
+            <a:pPr algn="ctr"/>
+            <a:r>
+              <a:rPr lang="en-US" dirty="0"/>
+              <a:t>Ok</a:t>
+            </a:r>
+          </a:p>
+        </p:txBody>
+      </p:sp>
+      <p:sp>
+        <p:nvSpPr>
+          <p:cNvPr id="210" name="&quot;No&quot; Symbol 209">
+            <a:extLst>
+              <a:ext uri="{FF2B5EF4-FFF2-40B4-BE49-F238E27FC236}">
+                <a16:creationId xmlns:a16="http://schemas.microsoft.com/office/drawing/2014/main" id="{D7F45CF3-257C-3745-803E-76557A37C633}"/>
+              </a:ext>
+            </a:extLst>
+          </p:cNvPr>
+          <p:cNvSpPr/>
+          <p:nvPr/>
+        </p:nvSpPr>
+        <p:spPr>
+          <a:xfrm>
+            <a:off x="10796338" y="2547045"/>
+            <a:ext cx="653706" cy="611328"/>
+          </a:xfrm>
+          <a:prstGeom prst="noSmoking">
+            <a:avLst/>
+          </a:prstGeom>
+          <a:solidFill>
+            <a:srgbClr val="FF0000"/>
+          </a:solidFill>
+          <a:ln>
+            <a:noFill/>
+          </a:ln>
+        </p:spPr>
+        <p:style>
+          <a:lnRef idx="2">
+            <a:schemeClr val="accent1">
+              <a:shade val="50000"/>
+            </a:schemeClr>
+          </a:lnRef>
+          <a:fillRef idx="1">
+            <a:schemeClr val="accent1"/>
+          </a:fillRef>
+          <a:effectRef idx="0">
+            <a:schemeClr val="accent1"/>
+          </a:effectRef>
+          <a:fontRef idx="minor">
+            <a:schemeClr val="lt1"/>
+          </a:fontRef>
+        </p:style>
+        <p:txBody>
+          <a:bodyPr rtlCol="0" anchor="ctr"/>
+          <a:lstStyle/>
+          <a:p>
+            <a:pPr algn="ctr"/>
+            <a:endParaRPr lang="en-US" dirty="0">
+              <a:solidFill>
+                <a:schemeClr val="tx1"/>
+              </a:solidFill>
+            </a:endParaRPr>
+          </a:p>
+        </p:txBody>
+      </p:sp>
+      <p:grpSp>
+        <p:nvGrpSpPr>
+          <p:cNvPr id="213" name="Group 212">
+            <a:extLst>
+              <a:ext uri="{FF2B5EF4-FFF2-40B4-BE49-F238E27FC236}">
+                <a16:creationId xmlns:a16="http://schemas.microsoft.com/office/drawing/2014/main" id="{6AE52CF4-68D4-424E-BFB1-37DB14A1040C}"/>
+              </a:ext>
+            </a:extLst>
+          </p:cNvPr>
+          <p:cNvGrpSpPr/>
+          <p:nvPr/>
+        </p:nvGrpSpPr>
+        <p:grpSpPr>
+          <a:xfrm>
+            <a:off x="10903441" y="6445301"/>
+            <a:ext cx="766185" cy="933509"/>
+            <a:chOff x="11532269" y="2547046"/>
+            <a:chExt cx="1814493" cy="2867146"/>
+          </a:xfrm>
+        </p:grpSpPr>
+        <p:sp>
+          <p:nvSpPr>
+            <p:cNvPr id="211" name="Diagonal Stripe 210">
+              <a:extLst>
+                <a:ext uri="{FF2B5EF4-FFF2-40B4-BE49-F238E27FC236}">
+                  <a16:creationId xmlns:a16="http://schemas.microsoft.com/office/drawing/2014/main" id="{87A30969-FD43-D740-A42A-3BBD8968A376}"/>
+                </a:ext>
+              </a:extLst>
+            </p:cNvPr>
+            <p:cNvSpPr/>
+            <p:nvPr/>
+          </p:nvSpPr>
+          <p:spPr>
+            <a:xfrm>
+              <a:off x="12225230" y="2547046"/>
+              <a:ext cx="1121532" cy="2867146"/>
+            </a:xfrm>
+            <a:prstGeom prst="diagStripe">
+              <a:avLst>
+                <a:gd name="adj" fmla="val 75738"/>
+              </a:avLst>
+            </a:prstGeom>
+            <a:solidFill>
+              <a:srgbClr val="00B050"/>
+            </a:solidFill>
+            <a:ln>
+              <a:noFill/>
+            </a:ln>
+          </p:spPr>
+          <p:style>
+            <a:lnRef idx="2">
+              <a:schemeClr val="accent1">
+                <a:shade val="50000"/>
+              </a:schemeClr>
+            </a:lnRef>
+            <a:fillRef idx="1">
+              <a:schemeClr val="accent1"/>
+            </a:fillRef>
+            <a:effectRef idx="0">
+              <a:schemeClr val="accent1"/>
+            </a:effectRef>
+            <a:fontRef idx="minor">
+              <a:schemeClr val="lt1"/>
+            </a:fontRef>
+          </p:style>
+          <p:txBody>
+            <a:bodyPr rtlCol="0" anchor="ctr"/>
+            <a:lstStyle/>
+            <a:p>
+              <a:pPr algn="ctr"/>
+              <a:endParaRPr lang="en-US">
+                <a:solidFill>
+                  <a:schemeClr val="tx1"/>
+                </a:solidFill>
+              </a:endParaRPr>
+            </a:p>
+          </p:txBody>
+        </p:sp>
+        <p:sp>
+          <p:nvSpPr>
+            <p:cNvPr id="212" name="Diagonal Stripe 211">
+              <a:extLst>
+                <a:ext uri="{FF2B5EF4-FFF2-40B4-BE49-F238E27FC236}">
+                  <a16:creationId xmlns:a16="http://schemas.microsoft.com/office/drawing/2014/main" id="{FA1A28D5-5F10-2448-B26F-EC82ACDE4D6B}"/>
+                </a:ext>
+              </a:extLst>
+            </p:cNvPr>
+            <p:cNvSpPr/>
+            <p:nvPr/>
+          </p:nvSpPr>
+          <p:spPr>
+            <a:xfrm flipH="1">
+              <a:off x="11532269" y="4061578"/>
+              <a:ext cx="713891" cy="1346685"/>
+            </a:xfrm>
+            <a:prstGeom prst="diagStripe">
+              <a:avLst/>
+            </a:prstGeom>
+            <a:solidFill>
+              <a:srgbClr val="00B050"/>
+            </a:solidFill>
+            <a:ln>
+              <a:noFill/>
+            </a:ln>
+          </p:spPr>
+          <p:style>
+            <a:lnRef idx="2">
+              <a:schemeClr val="accent1">
+                <a:shade val="50000"/>
+              </a:schemeClr>
+            </a:lnRef>
+            <a:fillRef idx="1">
+              <a:schemeClr val="accent1"/>
+            </a:fillRef>
+            <a:effectRef idx="0">
+              <a:schemeClr val="accent1"/>
+            </a:effectRef>
+            <a:fontRef idx="minor">
+              <a:schemeClr val="lt1"/>
+            </a:fontRef>
+          </p:style>
+          <p:txBody>
+            <a:bodyPr rtlCol="0" anchor="ctr"/>
+            <a:lstStyle/>
+            <a:p>
+              <a:pPr algn="ctr"/>
+              <a:endParaRPr lang="en-US">
+                <a:solidFill>
+                  <a:schemeClr val="tx1"/>
+                </a:solidFill>
+              </a:endParaRPr>
+            </a:p>
+          </p:txBody>
+        </p:sp>
+      </p:grpSp>
+    </p:spTree>
+    <p:extLst>
+      <p:ext uri="{BB962C8B-B14F-4D97-AF65-F5344CB8AC3E}">
+        <p14:creationId xmlns:p14="http://schemas.microsoft.com/office/powerpoint/2010/main" val="669721151"/>
       </p:ext>
     </p:extLst>
   </p:cSld>

</xml_diff>

<commit_message>
Minor touch to image
</commit_message>
<xml_diff>
--- a/interim_report/images/scanner_structure.pptx
+++ b/interim_report/images/scanner_structure.pptx
@@ -7648,7 +7648,23 @@
                 <a:p>
                   <a:r>
                     <a:rPr lang="en-US" sz="1000" dirty="0"/>
-                    <a:t>&lt;script&gt;alert(“XSS”)&lt;/script&gt;</a:t>
+                    <a:t>&lt;</a:t>
+                  </a:r>
+                  <a:r>
+                    <a:rPr lang="en-US" sz="1000" dirty="0" err="1"/>
+                    <a:t>ScRiPt</a:t>
+                  </a:r>
+                  <a:r>
+                    <a:rPr lang="en-US" sz="1000" dirty="0"/>
+                    <a:t>&gt;alert(“XSS”)&lt;/</a:t>
+                  </a:r>
+                  <a:r>
+                    <a:rPr lang="en-US" sz="1000" dirty="0" err="1"/>
+                    <a:t>ScRiPt</a:t>
+                  </a:r>
+                  <a:r>
+                    <a:rPr lang="en-US" sz="1000" dirty="0"/>
+                    <a:t>&gt;</a:t>
                   </a:r>
                 </a:p>
               </p:txBody>

</xml_diff>